<commit_message>
added esp32 firmware code, updated powerpoint, updated docker-compose.yml for local development
</commit_message>
<xml_diff>
--- a/documentation/presentation/v1.pptx
+++ b/documentation/presentation/v1.pptx
@@ -9,12 +9,19 @@
     <p:sldId id="257" r:id="rId3"/>
     <p:sldId id="258" r:id="rId4"/>
     <p:sldId id="259" r:id="rId5"/>
-    <p:sldId id="260" r:id="rId6"/>
+    <p:sldId id="267" r:id="rId6"/>
     <p:sldId id="261" r:id="rId7"/>
-    <p:sldId id="262" r:id="rId8"/>
-    <p:sldId id="264" r:id="rId9"/>
-    <p:sldId id="265" r:id="rId10"/>
-    <p:sldId id="266" r:id="rId11"/>
+    <p:sldId id="260" r:id="rId8"/>
+    <p:sldId id="271" r:id="rId9"/>
+    <p:sldId id="272" r:id="rId10"/>
+    <p:sldId id="274" r:id="rId11"/>
+    <p:sldId id="276" r:id="rId12"/>
+    <p:sldId id="273" r:id="rId13"/>
+    <p:sldId id="275" r:id="rId14"/>
+    <p:sldId id="262" r:id="rId15"/>
+    <p:sldId id="270" r:id="rId16"/>
+    <p:sldId id="268" r:id="rId17"/>
+    <p:sldId id="269" r:id="rId18"/>
   </p:sldIdLst>
   <p:sldSz cx="12192000" cy="6858000"/>
   <p:notesSz cx="6858000" cy="9144000"/>
@@ -250,7 +257,7 @@
           <a:p>
             <a:fld id="{7EF88AAE-C86C-1E44-B69A-7594543F44FA}" type="datetimeFigureOut">
               <a:rPr lang="en-US" smtClean="0"/>
-              <a:t>11/26/2021</a:t>
+              <a:t>12/7/2021</a:t>
             </a:fld>
             <a:endParaRPr lang="en-US"/>
           </a:p>
@@ -418,7 +425,7 @@
           <a:p>
             <a:fld id="{7EF88AAE-C86C-1E44-B69A-7594543F44FA}" type="datetimeFigureOut">
               <a:rPr lang="en-US" smtClean="0"/>
-              <a:t>11/26/2021</a:t>
+              <a:t>12/7/2021</a:t>
             </a:fld>
             <a:endParaRPr lang="en-US"/>
           </a:p>
@@ -596,7 +603,7 @@
           <a:p>
             <a:fld id="{7EF88AAE-C86C-1E44-B69A-7594543F44FA}" type="datetimeFigureOut">
               <a:rPr lang="en-US" smtClean="0"/>
-              <a:t>11/26/2021</a:t>
+              <a:t>12/7/2021</a:t>
             </a:fld>
             <a:endParaRPr lang="en-US"/>
           </a:p>
@@ -764,7 +771,7 @@
           <a:p>
             <a:fld id="{7EF88AAE-C86C-1E44-B69A-7594543F44FA}" type="datetimeFigureOut">
               <a:rPr lang="en-US" smtClean="0"/>
-              <a:t>11/26/2021</a:t>
+              <a:t>12/7/2021</a:t>
             </a:fld>
             <a:endParaRPr lang="en-US"/>
           </a:p>
@@ -1009,7 +1016,7 @@
           <a:p>
             <a:fld id="{7EF88AAE-C86C-1E44-B69A-7594543F44FA}" type="datetimeFigureOut">
               <a:rPr lang="en-US" smtClean="0"/>
-              <a:t>11/26/2021</a:t>
+              <a:t>12/7/2021</a:t>
             </a:fld>
             <a:endParaRPr lang="en-US"/>
           </a:p>
@@ -1238,7 +1245,7 @@
           <a:p>
             <a:fld id="{7EF88AAE-C86C-1E44-B69A-7594543F44FA}" type="datetimeFigureOut">
               <a:rPr lang="en-US" smtClean="0"/>
-              <a:t>11/26/2021</a:t>
+              <a:t>12/7/2021</a:t>
             </a:fld>
             <a:endParaRPr lang="en-US"/>
           </a:p>
@@ -1602,7 +1609,7 @@
           <a:p>
             <a:fld id="{7EF88AAE-C86C-1E44-B69A-7594543F44FA}" type="datetimeFigureOut">
               <a:rPr lang="en-US" smtClean="0"/>
-              <a:t>11/26/2021</a:t>
+              <a:t>12/7/2021</a:t>
             </a:fld>
             <a:endParaRPr lang="en-US"/>
           </a:p>
@@ -1719,7 +1726,7 @@
           <a:p>
             <a:fld id="{7EF88AAE-C86C-1E44-B69A-7594543F44FA}" type="datetimeFigureOut">
               <a:rPr lang="en-US" smtClean="0"/>
-              <a:t>11/26/2021</a:t>
+              <a:t>12/7/2021</a:t>
             </a:fld>
             <a:endParaRPr lang="en-US"/>
           </a:p>
@@ -1814,7 +1821,7 @@
           <a:p>
             <a:fld id="{7EF88AAE-C86C-1E44-B69A-7594543F44FA}" type="datetimeFigureOut">
               <a:rPr lang="en-US" smtClean="0"/>
-              <a:t>11/26/2021</a:t>
+              <a:t>12/7/2021</a:t>
             </a:fld>
             <a:endParaRPr lang="en-US"/>
           </a:p>
@@ -2089,7 +2096,7 @@
           <a:p>
             <a:fld id="{7EF88AAE-C86C-1E44-B69A-7594543F44FA}" type="datetimeFigureOut">
               <a:rPr lang="en-US" smtClean="0"/>
-              <a:t>11/26/2021</a:t>
+              <a:t>12/7/2021</a:t>
             </a:fld>
             <a:endParaRPr lang="en-US"/>
           </a:p>
@@ -2341,7 +2348,7 @@
           <a:p>
             <a:fld id="{7EF88AAE-C86C-1E44-B69A-7594543F44FA}" type="datetimeFigureOut">
               <a:rPr lang="en-US" smtClean="0"/>
-              <a:t>11/26/2021</a:t>
+              <a:t>12/7/2021</a:t>
             </a:fld>
             <a:endParaRPr lang="en-US"/>
           </a:p>
@@ -2552,7 +2559,7 @@
           <a:p>
             <a:fld id="{7EF88AAE-C86C-1E44-B69A-7594543F44FA}" type="datetimeFigureOut">
               <a:rPr lang="en-US" smtClean="0"/>
-              <a:t>11/26/2021</a:t>
+              <a:t>12/7/2021</a:t>
             </a:fld>
             <a:endParaRPr lang="en-US"/>
           </a:p>
@@ -7048,6 +7055,1203 @@
 <file path=ppt/slides/slide10.xml><?xml version="1.0" encoding="utf-8"?>
 <p:sld xmlns:a="http://schemas.openxmlformats.org/drawingml/2006/main" xmlns:r="http://schemas.openxmlformats.org/officeDocument/2006/relationships" xmlns:p="http://schemas.openxmlformats.org/presentationml/2006/main">
   <p:cSld>
+    <p:bg>
+      <p:bgPr>
+        <a:blipFill dpi="0" rotWithShape="1">
+          <a:blip r:embed="rId2">
+            <a:lum/>
+          </a:blip>
+          <a:srcRect/>
+          <a:stretch>
+            <a:fillRect/>
+          </a:stretch>
+        </a:blipFill>
+        <a:effectLst/>
+      </p:bgPr>
+    </p:bg>
+    <p:spTree>
+      <p:nvGrpSpPr>
+        <p:cNvPr id="1" name=""/>
+        <p:cNvGrpSpPr/>
+        <p:nvPr/>
+      </p:nvGrpSpPr>
+      <p:grpSpPr>
+        <a:xfrm>
+          <a:off x="0" y="0"/>
+          <a:ext cx="0" cy="0"/>
+          <a:chOff x="0" y="0"/>
+          <a:chExt cx="0" cy="0"/>
+        </a:xfrm>
+      </p:grpSpPr>
+      <p:sp>
+        <p:nvSpPr>
+          <p:cNvPr id="7" name="TextBox 6"/>
+          <p:cNvSpPr txBox="1"/>
+          <p:nvPr/>
+        </p:nvSpPr>
+        <p:spPr>
+          <a:xfrm>
+            <a:off x="4386862" y="442649"/>
+            <a:ext cx="8670770" cy="769441"/>
+          </a:xfrm>
+          <a:prstGeom prst="rect">
+            <a:avLst/>
+          </a:prstGeom>
+          <a:noFill/>
+        </p:spPr>
+        <p:txBody>
+          <a:bodyPr wrap="square" rtlCol="0">
+            <a:spAutoFit/>
+          </a:bodyPr>
+          <a:lstStyle/>
+          <a:p>
+            <a:r>
+              <a:rPr lang="en-US" sz="4400" dirty="0">
+                <a:solidFill>
+                  <a:srgbClr val="CFB87C"/>
+                </a:solidFill>
+                <a:latin typeface="Arial" charset="0"/>
+                <a:ea typeface="Arial" charset="0"/>
+                <a:cs typeface="Arial" charset="0"/>
+              </a:rPr>
+              <a:t>CI/CD</a:t>
+            </a:r>
+          </a:p>
+        </p:txBody>
+      </p:sp>
+      <p:sp>
+        <p:nvSpPr>
+          <p:cNvPr id="9" name="Rectangle 8"/>
+          <p:cNvSpPr/>
+          <p:nvPr/>
+        </p:nvSpPr>
+        <p:spPr>
+          <a:xfrm>
+            <a:off x="0" y="0"/>
+            <a:ext cx="4224528" cy="5943600"/>
+          </a:xfrm>
+          <a:prstGeom prst="rect">
+            <a:avLst/>
+          </a:prstGeom>
+          <a:solidFill>
+            <a:schemeClr val="bg2">
+              <a:lumMod val="90000"/>
+            </a:schemeClr>
+          </a:solidFill>
+          <a:ln>
+            <a:noFill/>
+          </a:ln>
+        </p:spPr>
+        <p:style>
+          <a:lnRef idx="1">
+            <a:schemeClr val="accent1"/>
+          </a:lnRef>
+          <a:fillRef idx="3">
+            <a:schemeClr val="accent1"/>
+          </a:fillRef>
+          <a:effectRef idx="2">
+            <a:schemeClr val="accent1"/>
+          </a:effectRef>
+          <a:fontRef idx="minor">
+            <a:schemeClr val="lt1"/>
+          </a:fontRef>
+        </p:style>
+        <p:txBody>
+          <a:bodyPr rtlCol="0" anchor="ctr"/>
+          <a:lstStyle/>
+          <a:p>
+            <a:pPr algn="ctr"/>
+            <a:endParaRPr lang="en-US" dirty="0"/>
+          </a:p>
+        </p:txBody>
+      </p:sp>
+      <p:pic>
+        <p:nvPicPr>
+          <p:cNvPr id="4098" name="Picture 2" descr="GitHub Actions · GitHub">
+            <a:extLst>
+              <a:ext uri="{FF2B5EF4-FFF2-40B4-BE49-F238E27FC236}">
+                <a16:creationId xmlns:a16="http://schemas.microsoft.com/office/drawing/2014/main" id="{A2E8E6DA-1328-4CE3-9D87-DB08E5F454AE}"/>
+              </a:ext>
+            </a:extLst>
+          </p:cNvPr>
+          <p:cNvPicPr>
+            <a:picLocks noChangeAspect="1" noChangeArrowheads="1"/>
+          </p:cNvPicPr>
+          <p:nvPr/>
+        </p:nvPicPr>
+        <p:blipFill>
+          <a:blip r:embed="rId3">
+            <a:extLst>
+              <a:ext uri="{28A0092B-C50C-407E-A947-70E740481C1C}">
+                <a14:useLocalDpi xmlns:a14="http://schemas.microsoft.com/office/drawing/2010/main" val="0"/>
+              </a:ext>
+            </a:extLst>
+          </a:blip>
+          <a:srcRect/>
+          <a:stretch>
+            <a:fillRect/>
+          </a:stretch>
+        </p:blipFill>
+        <p:spPr bwMode="auto">
+          <a:xfrm>
+            <a:off x="1137758" y="3396936"/>
+            <a:ext cx="1628978" cy="1628978"/>
+          </a:xfrm>
+          <a:prstGeom prst="rect">
+            <a:avLst/>
+          </a:prstGeom>
+          <a:noFill/>
+          <a:extLst>
+            <a:ext uri="{909E8E84-426E-40DD-AFC4-6F175D3DCCD1}">
+              <a14:hiddenFill xmlns:a14="http://schemas.microsoft.com/office/drawing/2010/main">
+                <a:solidFill>
+                  <a:srgbClr val="FFFFFF"/>
+                </a:solidFill>
+              </a14:hiddenFill>
+            </a:ext>
+          </a:extLst>
+        </p:spPr>
+      </p:pic>
+      <p:pic>
+        <p:nvPicPr>
+          <p:cNvPr id="4100" name="Picture 4">
+            <a:extLst>
+              <a:ext uri="{FF2B5EF4-FFF2-40B4-BE49-F238E27FC236}">
+                <a16:creationId xmlns:a16="http://schemas.microsoft.com/office/drawing/2014/main" id="{1244F370-25FA-4D9A-91FE-78DE3B28C527}"/>
+              </a:ext>
+            </a:extLst>
+          </p:cNvPr>
+          <p:cNvPicPr>
+            <a:picLocks noChangeAspect="1" noChangeArrowheads="1"/>
+          </p:cNvPicPr>
+          <p:nvPr/>
+        </p:nvPicPr>
+        <p:blipFill>
+          <a:blip r:embed="rId4">
+            <a:extLst>
+              <a:ext uri="{28A0092B-C50C-407E-A947-70E740481C1C}">
+                <a14:useLocalDpi xmlns:a14="http://schemas.microsoft.com/office/drawing/2010/main" val="0"/>
+              </a:ext>
+            </a:extLst>
+          </a:blip>
+          <a:srcRect/>
+          <a:stretch>
+            <a:fillRect/>
+          </a:stretch>
+        </p:blipFill>
+        <p:spPr bwMode="auto">
+          <a:xfrm>
+            <a:off x="996140" y="989814"/>
+            <a:ext cx="1912215" cy="1912215"/>
+          </a:xfrm>
+          <a:prstGeom prst="rect">
+            <a:avLst/>
+          </a:prstGeom>
+          <a:noFill/>
+          <a:extLst>
+            <a:ext uri="{909E8E84-426E-40DD-AFC4-6F175D3DCCD1}">
+              <a14:hiddenFill xmlns:a14="http://schemas.microsoft.com/office/drawing/2010/main">
+                <a:solidFill>
+                  <a:srgbClr val="FFFFFF"/>
+                </a:solidFill>
+              </a14:hiddenFill>
+            </a:ext>
+          </a:extLst>
+        </p:spPr>
+      </p:pic>
+      <p:pic>
+        <p:nvPicPr>
+          <p:cNvPr id="3" name="Picture 2">
+            <a:extLst>
+              <a:ext uri="{FF2B5EF4-FFF2-40B4-BE49-F238E27FC236}">
+                <a16:creationId xmlns:a16="http://schemas.microsoft.com/office/drawing/2014/main" id="{EE4D0312-DA4B-4E5C-BA2B-FCCD2804A8D9}"/>
+              </a:ext>
+            </a:extLst>
+          </p:cNvPr>
+          <p:cNvPicPr>
+            <a:picLocks noChangeAspect="1"/>
+          </p:cNvPicPr>
+          <p:nvPr/>
+        </p:nvPicPr>
+        <p:blipFill>
+          <a:blip r:embed="rId5"/>
+          <a:stretch>
+            <a:fillRect/>
+          </a:stretch>
+        </p:blipFill>
+        <p:spPr>
+          <a:xfrm>
+            <a:off x="4515440" y="1581099"/>
+            <a:ext cx="6312232" cy="3858415"/>
+          </a:xfrm>
+          <a:prstGeom prst="rect">
+            <a:avLst/>
+          </a:prstGeom>
+        </p:spPr>
+      </p:pic>
+      <p:sp>
+        <p:nvSpPr>
+          <p:cNvPr id="4" name="Arrow: Striped Right 3">
+            <a:extLst>
+              <a:ext uri="{FF2B5EF4-FFF2-40B4-BE49-F238E27FC236}">
+                <a16:creationId xmlns:a16="http://schemas.microsoft.com/office/drawing/2014/main" id="{FAB05806-BDCE-46D2-A939-2292A03F46D3}"/>
+              </a:ext>
+            </a:extLst>
+          </p:cNvPr>
+          <p:cNvSpPr/>
+          <p:nvPr/>
+        </p:nvSpPr>
+        <p:spPr>
+          <a:xfrm rot="7622401">
+            <a:off x="6262883" y="4233798"/>
+            <a:ext cx="854968" cy="562780"/>
+          </a:xfrm>
+          <a:prstGeom prst="stripedRightArrow">
+            <a:avLst/>
+          </a:prstGeom>
+        </p:spPr>
+        <p:style>
+          <a:lnRef idx="2">
+            <a:schemeClr val="accent6"/>
+          </a:lnRef>
+          <a:fillRef idx="1">
+            <a:schemeClr val="lt1"/>
+          </a:fillRef>
+          <a:effectRef idx="0">
+            <a:schemeClr val="accent6"/>
+          </a:effectRef>
+          <a:fontRef idx="minor">
+            <a:schemeClr val="dk1"/>
+          </a:fontRef>
+        </p:style>
+        <p:txBody>
+          <a:bodyPr rtlCol="0" anchor="ctr"/>
+          <a:lstStyle/>
+          <a:p>
+            <a:pPr algn="ctr"/>
+            <a:endParaRPr lang="en-US" dirty="0"/>
+          </a:p>
+        </p:txBody>
+      </p:sp>
+      <p:sp>
+        <p:nvSpPr>
+          <p:cNvPr id="2" name="Rectangle: Rounded Corners 1">
+            <a:extLst>
+              <a:ext uri="{FF2B5EF4-FFF2-40B4-BE49-F238E27FC236}">
+                <a16:creationId xmlns:a16="http://schemas.microsoft.com/office/drawing/2014/main" id="{28317AA5-B1E3-46FD-A842-DBDF8617356A}"/>
+              </a:ext>
+            </a:extLst>
+          </p:cNvPr>
+          <p:cNvSpPr/>
+          <p:nvPr/>
+        </p:nvSpPr>
+        <p:spPr>
+          <a:xfrm>
+            <a:off x="8342722" y="4877069"/>
+            <a:ext cx="1451727" cy="297690"/>
+          </a:xfrm>
+          <a:prstGeom prst="roundRect">
+            <a:avLst/>
+          </a:prstGeom>
+          <a:noFill/>
+          <a:ln w="38100"/>
+        </p:spPr>
+        <p:style>
+          <a:lnRef idx="2">
+            <a:schemeClr val="accent6"/>
+          </a:lnRef>
+          <a:fillRef idx="1">
+            <a:schemeClr val="lt1"/>
+          </a:fillRef>
+          <a:effectRef idx="0">
+            <a:schemeClr val="accent6"/>
+          </a:effectRef>
+          <a:fontRef idx="minor">
+            <a:schemeClr val="dk1"/>
+          </a:fontRef>
+        </p:style>
+        <p:txBody>
+          <a:bodyPr rtlCol="0" anchor="ctr"/>
+          <a:lstStyle/>
+          <a:p>
+            <a:pPr algn="ctr"/>
+            <a:endParaRPr lang="en-US" dirty="0"/>
+          </a:p>
+        </p:txBody>
+      </p:sp>
+    </p:spTree>
+    <p:extLst>
+      <p:ext uri="{BB962C8B-B14F-4D97-AF65-F5344CB8AC3E}">
+        <p14:creationId xmlns:p14="http://schemas.microsoft.com/office/powerpoint/2010/main" val="2970526119"/>
+      </p:ext>
+    </p:extLst>
+  </p:cSld>
+  <p:clrMapOvr>
+    <a:masterClrMapping/>
+  </p:clrMapOvr>
+</p:sld>
+</file>
+
+<file path=ppt/slides/slide11.xml><?xml version="1.0" encoding="utf-8"?>
+<p:sld xmlns:a="http://schemas.openxmlformats.org/drawingml/2006/main" xmlns:r="http://schemas.openxmlformats.org/officeDocument/2006/relationships" xmlns:p="http://schemas.openxmlformats.org/presentationml/2006/main">
+  <p:cSld>
+    <p:bg>
+      <p:bgPr>
+        <a:blipFill dpi="0" rotWithShape="1">
+          <a:blip r:embed="rId2">
+            <a:lum/>
+          </a:blip>
+          <a:srcRect/>
+          <a:stretch>
+            <a:fillRect/>
+          </a:stretch>
+        </a:blipFill>
+        <a:effectLst/>
+      </p:bgPr>
+    </p:bg>
+    <p:spTree>
+      <p:nvGrpSpPr>
+        <p:cNvPr id="1" name=""/>
+        <p:cNvGrpSpPr/>
+        <p:nvPr/>
+      </p:nvGrpSpPr>
+      <p:grpSpPr>
+        <a:xfrm>
+          <a:off x="0" y="0"/>
+          <a:ext cx="0" cy="0"/>
+          <a:chOff x="0" y="0"/>
+          <a:chExt cx="0" cy="0"/>
+        </a:xfrm>
+      </p:grpSpPr>
+      <p:sp>
+        <p:nvSpPr>
+          <p:cNvPr id="7" name="TextBox 6"/>
+          <p:cNvSpPr txBox="1"/>
+          <p:nvPr/>
+        </p:nvSpPr>
+        <p:spPr>
+          <a:xfrm>
+            <a:off x="4386862" y="442649"/>
+            <a:ext cx="8670770" cy="769441"/>
+          </a:xfrm>
+          <a:prstGeom prst="rect">
+            <a:avLst/>
+          </a:prstGeom>
+          <a:noFill/>
+        </p:spPr>
+        <p:txBody>
+          <a:bodyPr wrap="square" rtlCol="0">
+            <a:spAutoFit/>
+          </a:bodyPr>
+          <a:lstStyle/>
+          <a:p>
+            <a:r>
+              <a:rPr lang="en-US" sz="4400" dirty="0">
+                <a:solidFill>
+                  <a:srgbClr val="CFB87C"/>
+                </a:solidFill>
+                <a:latin typeface="Arial" charset="0"/>
+                <a:ea typeface="Arial" charset="0"/>
+                <a:cs typeface="Arial" charset="0"/>
+              </a:rPr>
+              <a:t>CI/CD</a:t>
+            </a:r>
+          </a:p>
+        </p:txBody>
+      </p:sp>
+      <p:sp>
+        <p:nvSpPr>
+          <p:cNvPr id="9" name="Rectangle 8"/>
+          <p:cNvSpPr/>
+          <p:nvPr/>
+        </p:nvSpPr>
+        <p:spPr>
+          <a:xfrm>
+            <a:off x="0" y="0"/>
+            <a:ext cx="4224528" cy="5943600"/>
+          </a:xfrm>
+          <a:prstGeom prst="rect">
+            <a:avLst/>
+          </a:prstGeom>
+          <a:solidFill>
+            <a:schemeClr val="bg2">
+              <a:lumMod val="90000"/>
+            </a:schemeClr>
+          </a:solidFill>
+          <a:ln>
+            <a:noFill/>
+          </a:ln>
+        </p:spPr>
+        <p:style>
+          <a:lnRef idx="1">
+            <a:schemeClr val="accent1"/>
+          </a:lnRef>
+          <a:fillRef idx="3">
+            <a:schemeClr val="accent1"/>
+          </a:fillRef>
+          <a:effectRef idx="2">
+            <a:schemeClr val="accent1"/>
+          </a:effectRef>
+          <a:fontRef idx="minor">
+            <a:schemeClr val="lt1"/>
+          </a:fontRef>
+        </p:style>
+        <p:txBody>
+          <a:bodyPr rtlCol="0" anchor="ctr"/>
+          <a:lstStyle/>
+          <a:p>
+            <a:pPr algn="ctr"/>
+            <a:endParaRPr lang="en-US" dirty="0"/>
+          </a:p>
+        </p:txBody>
+      </p:sp>
+      <p:pic>
+        <p:nvPicPr>
+          <p:cNvPr id="4098" name="Picture 2" descr="GitHub Actions · GitHub">
+            <a:extLst>
+              <a:ext uri="{FF2B5EF4-FFF2-40B4-BE49-F238E27FC236}">
+                <a16:creationId xmlns:a16="http://schemas.microsoft.com/office/drawing/2014/main" id="{A2E8E6DA-1328-4CE3-9D87-DB08E5F454AE}"/>
+              </a:ext>
+            </a:extLst>
+          </p:cNvPr>
+          <p:cNvPicPr>
+            <a:picLocks noChangeAspect="1" noChangeArrowheads="1"/>
+          </p:cNvPicPr>
+          <p:nvPr/>
+        </p:nvPicPr>
+        <p:blipFill>
+          <a:blip r:embed="rId3">
+            <a:extLst>
+              <a:ext uri="{28A0092B-C50C-407E-A947-70E740481C1C}">
+                <a14:useLocalDpi xmlns:a14="http://schemas.microsoft.com/office/drawing/2010/main" val="0"/>
+              </a:ext>
+            </a:extLst>
+          </a:blip>
+          <a:srcRect/>
+          <a:stretch>
+            <a:fillRect/>
+          </a:stretch>
+        </p:blipFill>
+        <p:spPr bwMode="auto">
+          <a:xfrm>
+            <a:off x="1137758" y="3396936"/>
+            <a:ext cx="1628978" cy="1628978"/>
+          </a:xfrm>
+          <a:prstGeom prst="rect">
+            <a:avLst/>
+          </a:prstGeom>
+          <a:noFill/>
+          <a:extLst>
+            <a:ext uri="{909E8E84-426E-40DD-AFC4-6F175D3DCCD1}">
+              <a14:hiddenFill xmlns:a14="http://schemas.microsoft.com/office/drawing/2010/main">
+                <a:solidFill>
+                  <a:srgbClr val="FFFFFF"/>
+                </a:solidFill>
+              </a14:hiddenFill>
+            </a:ext>
+          </a:extLst>
+        </p:spPr>
+      </p:pic>
+      <p:pic>
+        <p:nvPicPr>
+          <p:cNvPr id="4100" name="Picture 4">
+            <a:extLst>
+              <a:ext uri="{FF2B5EF4-FFF2-40B4-BE49-F238E27FC236}">
+                <a16:creationId xmlns:a16="http://schemas.microsoft.com/office/drawing/2014/main" id="{1244F370-25FA-4D9A-91FE-78DE3B28C527}"/>
+              </a:ext>
+            </a:extLst>
+          </p:cNvPr>
+          <p:cNvPicPr>
+            <a:picLocks noChangeAspect="1" noChangeArrowheads="1"/>
+          </p:cNvPicPr>
+          <p:nvPr/>
+        </p:nvPicPr>
+        <p:blipFill>
+          <a:blip r:embed="rId4">
+            <a:extLst>
+              <a:ext uri="{28A0092B-C50C-407E-A947-70E740481C1C}">
+                <a14:useLocalDpi xmlns:a14="http://schemas.microsoft.com/office/drawing/2010/main" val="0"/>
+              </a:ext>
+            </a:extLst>
+          </a:blip>
+          <a:srcRect/>
+          <a:stretch>
+            <a:fillRect/>
+          </a:stretch>
+        </p:blipFill>
+        <p:spPr bwMode="auto">
+          <a:xfrm>
+            <a:off x="996140" y="989814"/>
+            <a:ext cx="1912215" cy="1912215"/>
+          </a:xfrm>
+          <a:prstGeom prst="rect">
+            <a:avLst/>
+          </a:prstGeom>
+          <a:noFill/>
+          <a:extLst>
+            <a:ext uri="{909E8E84-426E-40DD-AFC4-6F175D3DCCD1}">
+              <a14:hiddenFill xmlns:a14="http://schemas.microsoft.com/office/drawing/2010/main">
+                <a:solidFill>
+                  <a:srgbClr val="FFFFFF"/>
+                </a:solidFill>
+              </a14:hiddenFill>
+            </a:ext>
+          </a:extLst>
+        </p:spPr>
+      </p:pic>
+      <p:pic>
+        <p:nvPicPr>
+          <p:cNvPr id="6" name="Picture 5">
+            <a:extLst>
+              <a:ext uri="{FF2B5EF4-FFF2-40B4-BE49-F238E27FC236}">
+                <a16:creationId xmlns:a16="http://schemas.microsoft.com/office/drawing/2014/main" id="{405477D7-A8EB-40E3-87C6-E820684C5FA8}"/>
+              </a:ext>
+            </a:extLst>
+          </p:cNvPr>
+          <p:cNvPicPr>
+            <a:picLocks noChangeAspect="1"/>
+          </p:cNvPicPr>
+          <p:nvPr/>
+        </p:nvPicPr>
+        <p:blipFill>
+          <a:blip r:embed="rId5"/>
+          <a:stretch>
+            <a:fillRect/>
+          </a:stretch>
+        </p:blipFill>
+        <p:spPr>
+          <a:xfrm>
+            <a:off x="6752262" y="148845"/>
+            <a:ext cx="3226234" cy="5645910"/>
+          </a:xfrm>
+          <a:prstGeom prst="rect">
+            <a:avLst/>
+          </a:prstGeom>
+        </p:spPr>
+      </p:pic>
+      <p:sp>
+        <p:nvSpPr>
+          <p:cNvPr id="13" name="Rectangle: Rounded Corners 12">
+            <a:extLst>
+              <a:ext uri="{FF2B5EF4-FFF2-40B4-BE49-F238E27FC236}">
+                <a16:creationId xmlns:a16="http://schemas.microsoft.com/office/drawing/2014/main" id="{BBD16052-93F0-46AB-AF9F-A36E419D192B}"/>
+              </a:ext>
+            </a:extLst>
+          </p:cNvPr>
+          <p:cNvSpPr/>
+          <p:nvPr/>
+        </p:nvSpPr>
+        <p:spPr>
+          <a:xfrm>
+            <a:off x="7173798" y="3056887"/>
+            <a:ext cx="2055043" cy="874090"/>
+          </a:xfrm>
+          <a:prstGeom prst="roundRect">
+            <a:avLst/>
+          </a:prstGeom>
+          <a:noFill/>
+          <a:ln w="38100"/>
+        </p:spPr>
+        <p:style>
+          <a:lnRef idx="2">
+            <a:schemeClr val="accent6"/>
+          </a:lnRef>
+          <a:fillRef idx="1">
+            <a:schemeClr val="lt1"/>
+          </a:fillRef>
+          <a:effectRef idx="0">
+            <a:schemeClr val="accent6"/>
+          </a:effectRef>
+          <a:fontRef idx="minor">
+            <a:schemeClr val="dk1"/>
+          </a:fontRef>
+        </p:style>
+        <p:txBody>
+          <a:bodyPr rtlCol="0" anchor="ctr"/>
+          <a:lstStyle/>
+          <a:p>
+            <a:pPr algn="ctr"/>
+            <a:r>
+              <a:rPr lang="en-US" dirty="0"/>
+              <a:t>c</a:t>
+            </a:r>
+          </a:p>
+        </p:txBody>
+      </p:sp>
+    </p:spTree>
+    <p:extLst>
+      <p:ext uri="{BB962C8B-B14F-4D97-AF65-F5344CB8AC3E}">
+        <p14:creationId xmlns:p14="http://schemas.microsoft.com/office/powerpoint/2010/main" val="341594359"/>
+      </p:ext>
+    </p:extLst>
+  </p:cSld>
+  <p:clrMapOvr>
+    <a:masterClrMapping/>
+  </p:clrMapOvr>
+</p:sld>
+</file>
+
+<file path=ppt/slides/slide12.xml><?xml version="1.0" encoding="utf-8"?>
+<p:sld xmlns:a="http://schemas.openxmlformats.org/drawingml/2006/main" xmlns:r="http://schemas.openxmlformats.org/officeDocument/2006/relationships" xmlns:p="http://schemas.openxmlformats.org/presentationml/2006/main">
+  <p:cSld>
+    <p:bg>
+      <p:bgPr>
+        <a:blipFill dpi="0" rotWithShape="1">
+          <a:blip r:embed="rId2">
+            <a:lum/>
+          </a:blip>
+          <a:srcRect/>
+          <a:stretch>
+            <a:fillRect/>
+          </a:stretch>
+        </a:blipFill>
+        <a:effectLst/>
+      </p:bgPr>
+    </p:bg>
+    <p:spTree>
+      <p:nvGrpSpPr>
+        <p:cNvPr id="1" name=""/>
+        <p:cNvGrpSpPr/>
+        <p:nvPr/>
+      </p:nvGrpSpPr>
+      <p:grpSpPr>
+        <a:xfrm>
+          <a:off x="0" y="0"/>
+          <a:ext cx="0" cy="0"/>
+          <a:chOff x="0" y="0"/>
+          <a:chExt cx="0" cy="0"/>
+        </a:xfrm>
+      </p:grpSpPr>
+      <p:sp>
+        <p:nvSpPr>
+          <p:cNvPr id="7" name="TextBox 6"/>
+          <p:cNvSpPr txBox="1"/>
+          <p:nvPr/>
+        </p:nvSpPr>
+        <p:spPr>
+          <a:xfrm>
+            <a:off x="4386862" y="442649"/>
+            <a:ext cx="8670770" cy="769441"/>
+          </a:xfrm>
+          <a:prstGeom prst="rect">
+            <a:avLst/>
+          </a:prstGeom>
+          <a:noFill/>
+        </p:spPr>
+        <p:txBody>
+          <a:bodyPr wrap="square" rtlCol="0">
+            <a:spAutoFit/>
+          </a:bodyPr>
+          <a:lstStyle/>
+          <a:p>
+            <a:r>
+              <a:rPr lang="en-US" sz="4400" dirty="0">
+                <a:solidFill>
+                  <a:srgbClr val="CFB87C"/>
+                </a:solidFill>
+                <a:latin typeface="Arial" charset="0"/>
+                <a:ea typeface="Arial" charset="0"/>
+                <a:cs typeface="Arial" charset="0"/>
+              </a:rPr>
+              <a:t>CI/CD</a:t>
+            </a:r>
+          </a:p>
+        </p:txBody>
+      </p:sp>
+      <p:sp>
+        <p:nvSpPr>
+          <p:cNvPr id="9" name="Rectangle 8"/>
+          <p:cNvSpPr/>
+          <p:nvPr/>
+        </p:nvSpPr>
+        <p:spPr>
+          <a:xfrm>
+            <a:off x="0" y="0"/>
+            <a:ext cx="4224528" cy="5943600"/>
+          </a:xfrm>
+          <a:prstGeom prst="rect">
+            <a:avLst/>
+          </a:prstGeom>
+          <a:solidFill>
+            <a:schemeClr val="bg2">
+              <a:lumMod val="90000"/>
+            </a:schemeClr>
+          </a:solidFill>
+          <a:ln>
+            <a:noFill/>
+          </a:ln>
+        </p:spPr>
+        <p:style>
+          <a:lnRef idx="1">
+            <a:schemeClr val="accent1"/>
+          </a:lnRef>
+          <a:fillRef idx="3">
+            <a:schemeClr val="accent1"/>
+          </a:fillRef>
+          <a:effectRef idx="2">
+            <a:schemeClr val="accent1"/>
+          </a:effectRef>
+          <a:fontRef idx="minor">
+            <a:schemeClr val="lt1"/>
+          </a:fontRef>
+        </p:style>
+        <p:txBody>
+          <a:bodyPr rtlCol="0" anchor="ctr"/>
+          <a:lstStyle/>
+          <a:p>
+            <a:pPr algn="ctr"/>
+            <a:endParaRPr lang="en-US" dirty="0"/>
+          </a:p>
+        </p:txBody>
+      </p:sp>
+      <p:pic>
+        <p:nvPicPr>
+          <p:cNvPr id="4098" name="Picture 2" descr="GitHub Actions · GitHub">
+            <a:extLst>
+              <a:ext uri="{FF2B5EF4-FFF2-40B4-BE49-F238E27FC236}">
+                <a16:creationId xmlns:a16="http://schemas.microsoft.com/office/drawing/2014/main" id="{A2E8E6DA-1328-4CE3-9D87-DB08E5F454AE}"/>
+              </a:ext>
+            </a:extLst>
+          </p:cNvPr>
+          <p:cNvPicPr>
+            <a:picLocks noChangeAspect="1" noChangeArrowheads="1"/>
+          </p:cNvPicPr>
+          <p:nvPr/>
+        </p:nvPicPr>
+        <p:blipFill>
+          <a:blip r:embed="rId3">
+            <a:extLst>
+              <a:ext uri="{28A0092B-C50C-407E-A947-70E740481C1C}">
+                <a14:useLocalDpi xmlns:a14="http://schemas.microsoft.com/office/drawing/2010/main" val="0"/>
+              </a:ext>
+            </a:extLst>
+          </a:blip>
+          <a:srcRect/>
+          <a:stretch>
+            <a:fillRect/>
+          </a:stretch>
+        </p:blipFill>
+        <p:spPr bwMode="auto">
+          <a:xfrm>
+            <a:off x="1137758" y="3396936"/>
+            <a:ext cx="1628978" cy="1628978"/>
+          </a:xfrm>
+          <a:prstGeom prst="rect">
+            <a:avLst/>
+          </a:prstGeom>
+          <a:noFill/>
+          <a:extLst>
+            <a:ext uri="{909E8E84-426E-40DD-AFC4-6F175D3DCCD1}">
+              <a14:hiddenFill xmlns:a14="http://schemas.microsoft.com/office/drawing/2010/main">
+                <a:solidFill>
+                  <a:srgbClr val="FFFFFF"/>
+                </a:solidFill>
+              </a14:hiddenFill>
+            </a:ext>
+          </a:extLst>
+        </p:spPr>
+      </p:pic>
+      <p:pic>
+        <p:nvPicPr>
+          <p:cNvPr id="4100" name="Picture 4">
+            <a:extLst>
+              <a:ext uri="{FF2B5EF4-FFF2-40B4-BE49-F238E27FC236}">
+                <a16:creationId xmlns:a16="http://schemas.microsoft.com/office/drawing/2014/main" id="{1244F370-25FA-4D9A-91FE-78DE3B28C527}"/>
+              </a:ext>
+            </a:extLst>
+          </p:cNvPr>
+          <p:cNvPicPr>
+            <a:picLocks noChangeAspect="1" noChangeArrowheads="1"/>
+          </p:cNvPicPr>
+          <p:nvPr/>
+        </p:nvPicPr>
+        <p:blipFill>
+          <a:blip r:embed="rId4">
+            <a:extLst>
+              <a:ext uri="{28A0092B-C50C-407E-A947-70E740481C1C}">
+                <a14:useLocalDpi xmlns:a14="http://schemas.microsoft.com/office/drawing/2010/main" val="0"/>
+              </a:ext>
+            </a:extLst>
+          </a:blip>
+          <a:srcRect/>
+          <a:stretch>
+            <a:fillRect/>
+          </a:stretch>
+        </p:blipFill>
+        <p:spPr bwMode="auto">
+          <a:xfrm>
+            <a:off x="996140" y="989814"/>
+            <a:ext cx="1912215" cy="1912215"/>
+          </a:xfrm>
+          <a:prstGeom prst="rect">
+            <a:avLst/>
+          </a:prstGeom>
+          <a:noFill/>
+          <a:extLst>
+            <a:ext uri="{909E8E84-426E-40DD-AFC4-6F175D3DCCD1}">
+              <a14:hiddenFill xmlns:a14="http://schemas.microsoft.com/office/drawing/2010/main">
+                <a:solidFill>
+                  <a:srgbClr val="FFFFFF"/>
+                </a:solidFill>
+              </a14:hiddenFill>
+            </a:ext>
+          </a:extLst>
+        </p:spPr>
+      </p:pic>
+      <p:pic>
+        <p:nvPicPr>
+          <p:cNvPr id="3" name="Picture 2">
+            <a:extLst>
+              <a:ext uri="{FF2B5EF4-FFF2-40B4-BE49-F238E27FC236}">
+                <a16:creationId xmlns:a16="http://schemas.microsoft.com/office/drawing/2014/main" id="{EE4D0312-DA4B-4E5C-BA2B-FCCD2804A8D9}"/>
+              </a:ext>
+            </a:extLst>
+          </p:cNvPr>
+          <p:cNvPicPr>
+            <a:picLocks noChangeAspect="1"/>
+          </p:cNvPicPr>
+          <p:nvPr/>
+        </p:nvPicPr>
+        <p:blipFill>
+          <a:blip r:embed="rId5"/>
+          <a:stretch>
+            <a:fillRect/>
+          </a:stretch>
+        </p:blipFill>
+        <p:spPr>
+          <a:xfrm>
+            <a:off x="4515440" y="1581099"/>
+            <a:ext cx="6312232" cy="3858415"/>
+          </a:xfrm>
+          <a:prstGeom prst="rect">
+            <a:avLst/>
+          </a:prstGeom>
+        </p:spPr>
+      </p:pic>
+      <p:sp>
+        <p:nvSpPr>
+          <p:cNvPr id="4" name="Arrow: Striped Right 3">
+            <a:extLst>
+              <a:ext uri="{FF2B5EF4-FFF2-40B4-BE49-F238E27FC236}">
+                <a16:creationId xmlns:a16="http://schemas.microsoft.com/office/drawing/2014/main" id="{FAB05806-BDCE-46D2-A939-2292A03F46D3}"/>
+              </a:ext>
+            </a:extLst>
+          </p:cNvPr>
+          <p:cNvSpPr/>
+          <p:nvPr/>
+        </p:nvSpPr>
+        <p:spPr>
+          <a:xfrm rot="18134324">
+            <a:off x="7954173" y="3418348"/>
+            <a:ext cx="854968" cy="562780"/>
+          </a:xfrm>
+          <a:prstGeom prst="stripedRightArrow">
+            <a:avLst/>
+          </a:prstGeom>
+        </p:spPr>
+        <p:style>
+          <a:lnRef idx="2">
+            <a:schemeClr val="accent6"/>
+          </a:lnRef>
+          <a:fillRef idx="1">
+            <a:schemeClr val="lt1"/>
+          </a:fillRef>
+          <a:effectRef idx="0">
+            <a:schemeClr val="accent6"/>
+          </a:effectRef>
+          <a:fontRef idx="minor">
+            <a:schemeClr val="dk1"/>
+          </a:fontRef>
+        </p:style>
+        <p:txBody>
+          <a:bodyPr rtlCol="0" anchor="ctr"/>
+          <a:lstStyle/>
+          <a:p>
+            <a:pPr algn="ctr"/>
+            <a:endParaRPr lang="en-US" dirty="0"/>
+          </a:p>
+        </p:txBody>
+      </p:sp>
+    </p:spTree>
+    <p:extLst>
+      <p:ext uri="{BB962C8B-B14F-4D97-AF65-F5344CB8AC3E}">
+        <p14:creationId xmlns:p14="http://schemas.microsoft.com/office/powerpoint/2010/main" val="960094053"/>
+      </p:ext>
+    </p:extLst>
+  </p:cSld>
+  <p:clrMapOvr>
+    <a:masterClrMapping/>
+  </p:clrMapOvr>
+</p:sld>
+</file>
+
+<file path=ppt/slides/slide13.xml><?xml version="1.0" encoding="utf-8"?>
+<p:sld xmlns:a="http://schemas.openxmlformats.org/drawingml/2006/main" xmlns:r="http://schemas.openxmlformats.org/officeDocument/2006/relationships" xmlns:p="http://schemas.openxmlformats.org/presentationml/2006/main">
+  <p:cSld>
+    <p:bg>
+      <p:bgPr>
+        <a:blipFill dpi="0" rotWithShape="1">
+          <a:blip r:embed="rId2">
+            <a:lum/>
+          </a:blip>
+          <a:srcRect/>
+          <a:stretch>
+            <a:fillRect/>
+          </a:stretch>
+        </a:blipFill>
+        <a:effectLst/>
+      </p:bgPr>
+    </p:bg>
+    <p:spTree>
+      <p:nvGrpSpPr>
+        <p:cNvPr id="1" name=""/>
+        <p:cNvGrpSpPr/>
+        <p:nvPr/>
+      </p:nvGrpSpPr>
+      <p:grpSpPr>
+        <a:xfrm>
+          <a:off x="0" y="0"/>
+          <a:ext cx="0" cy="0"/>
+          <a:chOff x="0" y="0"/>
+          <a:chExt cx="0" cy="0"/>
+        </a:xfrm>
+      </p:grpSpPr>
+      <p:pic>
+        <p:nvPicPr>
+          <p:cNvPr id="6" name="Picture 5">
+            <a:extLst>
+              <a:ext uri="{FF2B5EF4-FFF2-40B4-BE49-F238E27FC236}">
+                <a16:creationId xmlns:a16="http://schemas.microsoft.com/office/drawing/2014/main" id="{497E26AF-313D-4DD2-96B5-2135D9CA22BC}"/>
+              </a:ext>
+            </a:extLst>
+          </p:cNvPr>
+          <p:cNvPicPr>
+            <a:picLocks noChangeAspect="1"/>
+          </p:cNvPicPr>
+          <p:nvPr/>
+        </p:nvPicPr>
+        <p:blipFill>
+          <a:blip r:embed="rId3"/>
+          <a:stretch>
+            <a:fillRect/>
+          </a:stretch>
+        </p:blipFill>
+        <p:spPr>
+          <a:xfrm>
+            <a:off x="4496585" y="1788448"/>
+            <a:ext cx="7525732" cy="3088621"/>
+          </a:xfrm>
+          <a:prstGeom prst="rect">
+            <a:avLst/>
+          </a:prstGeom>
+        </p:spPr>
+      </p:pic>
+      <p:sp>
+        <p:nvSpPr>
+          <p:cNvPr id="7" name="TextBox 6"/>
+          <p:cNvSpPr txBox="1"/>
+          <p:nvPr/>
+        </p:nvSpPr>
+        <p:spPr>
+          <a:xfrm>
+            <a:off x="4386862" y="442649"/>
+            <a:ext cx="8670770" cy="769441"/>
+          </a:xfrm>
+          <a:prstGeom prst="rect">
+            <a:avLst/>
+          </a:prstGeom>
+          <a:noFill/>
+        </p:spPr>
+        <p:txBody>
+          <a:bodyPr wrap="square" rtlCol="0">
+            <a:spAutoFit/>
+          </a:bodyPr>
+          <a:lstStyle/>
+          <a:p>
+            <a:r>
+              <a:rPr lang="en-US" sz="4400" dirty="0">
+                <a:solidFill>
+                  <a:srgbClr val="CFB87C"/>
+                </a:solidFill>
+                <a:latin typeface="Arial" charset="0"/>
+                <a:ea typeface="Arial" charset="0"/>
+                <a:cs typeface="Arial" charset="0"/>
+              </a:rPr>
+              <a:t>CI/CD</a:t>
+            </a:r>
+          </a:p>
+        </p:txBody>
+      </p:sp>
+      <p:sp>
+        <p:nvSpPr>
+          <p:cNvPr id="9" name="Rectangle 8"/>
+          <p:cNvSpPr/>
+          <p:nvPr/>
+        </p:nvSpPr>
+        <p:spPr>
+          <a:xfrm>
+            <a:off x="0" y="0"/>
+            <a:ext cx="4224528" cy="5943600"/>
+          </a:xfrm>
+          <a:prstGeom prst="rect">
+            <a:avLst/>
+          </a:prstGeom>
+          <a:solidFill>
+            <a:schemeClr val="bg2">
+              <a:lumMod val="90000"/>
+            </a:schemeClr>
+          </a:solidFill>
+          <a:ln>
+            <a:noFill/>
+          </a:ln>
+        </p:spPr>
+        <p:style>
+          <a:lnRef idx="1">
+            <a:schemeClr val="accent1"/>
+          </a:lnRef>
+          <a:fillRef idx="3">
+            <a:schemeClr val="accent1"/>
+          </a:fillRef>
+          <a:effectRef idx="2">
+            <a:schemeClr val="accent1"/>
+          </a:effectRef>
+          <a:fontRef idx="minor">
+            <a:schemeClr val="lt1"/>
+          </a:fontRef>
+        </p:style>
+        <p:txBody>
+          <a:bodyPr rtlCol="0" anchor="ctr"/>
+          <a:lstStyle/>
+          <a:p>
+            <a:pPr algn="ctr"/>
+            <a:endParaRPr lang="en-US" dirty="0"/>
+          </a:p>
+        </p:txBody>
+      </p:sp>
+      <p:pic>
+        <p:nvPicPr>
+          <p:cNvPr id="4098" name="Picture 2" descr="GitHub Actions · GitHub">
+            <a:extLst>
+              <a:ext uri="{FF2B5EF4-FFF2-40B4-BE49-F238E27FC236}">
+                <a16:creationId xmlns:a16="http://schemas.microsoft.com/office/drawing/2014/main" id="{A2E8E6DA-1328-4CE3-9D87-DB08E5F454AE}"/>
+              </a:ext>
+            </a:extLst>
+          </p:cNvPr>
+          <p:cNvPicPr>
+            <a:picLocks noChangeAspect="1" noChangeArrowheads="1"/>
+          </p:cNvPicPr>
+          <p:nvPr/>
+        </p:nvPicPr>
+        <p:blipFill>
+          <a:blip r:embed="rId4">
+            <a:extLst>
+              <a:ext uri="{28A0092B-C50C-407E-A947-70E740481C1C}">
+                <a14:useLocalDpi xmlns:a14="http://schemas.microsoft.com/office/drawing/2010/main" val="0"/>
+              </a:ext>
+            </a:extLst>
+          </a:blip>
+          <a:srcRect/>
+          <a:stretch>
+            <a:fillRect/>
+          </a:stretch>
+        </p:blipFill>
+        <p:spPr bwMode="auto">
+          <a:xfrm>
+            <a:off x="1137758" y="3396936"/>
+            <a:ext cx="1628978" cy="1628978"/>
+          </a:xfrm>
+          <a:prstGeom prst="rect">
+            <a:avLst/>
+          </a:prstGeom>
+          <a:noFill/>
+          <a:extLst>
+            <a:ext uri="{909E8E84-426E-40DD-AFC4-6F175D3DCCD1}">
+              <a14:hiddenFill xmlns:a14="http://schemas.microsoft.com/office/drawing/2010/main">
+                <a:solidFill>
+                  <a:srgbClr val="FFFFFF"/>
+                </a:solidFill>
+              </a14:hiddenFill>
+            </a:ext>
+          </a:extLst>
+        </p:spPr>
+      </p:pic>
+      <p:pic>
+        <p:nvPicPr>
+          <p:cNvPr id="4100" name="Picture 4">
+            <a:extLst>
+              <a:ext uri="{FF2B5EF4-FFF2-40B4-BE49-F238E27FC236}">
+                <a16:creationId xmlns:a16="http://schemas.microsoft.com/office/drawing/2014/main" id="{1244F370-25FA-4D9A-91FE-78DE3B28C527}"/>
+              </a:ext>
+            </a:extLst>
+          </p:cNvPr>
+          <p:cNvPicPr>
+            <a:picLocks noChangeAspect="1" noChangeArrowheads="1"/>
+          </p:cNvPicPr>
+          <p:nvPr/>
+        </p:nvPicPr>
+        <p:blipFill>
+          <a:blip r:embed="rId5">
+            <a:extLst>
+              <a:ext uri="{28A0092B-C50C-407E-A947-70E740481C1C}">
+                <a14:useLocalDpi xmlns:a14="http://schemas.microsoft.com/office/drawing/2010/main" val="0"/>
+              </a:ext>
+            </a:extLst>
+          </a:blip>
+          <a:srcRect/>
+          <a:stretch>
+            <a:fillRect/>
+          </a:stretch>
+        </p:blipFill>
+        <p:spPr bwMode="auto">
+          <a:xfrm>
+            <a:off x="996140" y="989814"/>
+            <a:ext cx="1912215" cy="1912215"/>
+          </a:xfrm>
+          <a:prstGeom prst="rect">
+            <a:avLst/>
+          </a:prstGeom>
+          <a:noFill/>
+          <a:extLst>
+            <a:ext uri="{909E8E84-426E-40DD-AFC4-6F175D3DCCD1}">
+              <a14:hiddenFill xmlns:a14="http://schemas.microsoft.com/office/drawing/2010/main">
+                <a:solidFill>
+                  <a:srgbClr val="FFFFFF"/>
+                </a:solidFill>
+              </a14:hiddenFill>
+            </a:ext>
+          </a:extLst>
+        </p:spPr>
+      </p:pic>
+    </p:spTree>
+    <p:extLst>
+      <p:ext uri="{BB962C8B-B14F-4D97-AF65-F5344CB8AC3E}">
+        <p14:creationId xmlns:p14="http://schemas.microsoft.com/office/powerpoint/2010/main" val="614489740"/>
+      </p:ext>
+    </p:extLst>
+  </p:cSld>
+  <p:clrMapOvr>
+    <a:masterClrMapping/>
+  </p:clrMapOvr>
+</p:sld>
+</file>
+
+<file path=ppt/slides/slide14.xml><?xml version="1.0" encoding="utf-8"?>
+<p:sld xmlns:a="http://schemas.openxmlformats.org/drawingml/2006/main" xmlns:r="http://schemas.openxmlformats.org/officeDocument/2006/relationships" xmlns:p="http://schemas.openxmlformats.org/presentationml/2006/main">
+  <p:cSld>
+    <p:bg>
+      <p:bgPr>
+        <a:blipFill dpi="0" rotWithShape="1">
+          <a:blip r:embed="rId2">
+            <a:lum/>
+          </a:blip>
+          <a:srcRect/>
+          <a:stretch>
+            <a:fillRect/>
+          </a:stretch>
+        </a:blipFill>
+        <a:effectLst/>
+      </p:bgPr>
+    </p:bg>
     <p:spTree>
       <p:nvGrpSpPr>
         <p:cNvPr id="1" name=""/>
@@ -7139,7 +8343,7 @@
                 <a:ea typeface="Arial" charset="0"/>
                 <a:cs typeface="Arial" charset="0"/>
               </a:rPr>
-              <a:t>Citations</a:t>
+              <a:t>Demo</a:t>
             </a:r>
           </a:p>
         </p:txBody>
@@ -7153,7 +8357,7 @@
         <p:spPr>
           <a:xfrm>
             <a:off x="530874" y="1383408"/>
-            <a:ext cx="10626410" cy="2400657"/>
+            <a:ext cx="10626410" cy="1420325"/>
           </a:xfrm>
           <a:prstGeom prst="rect">
             <a:avLst/>
@@ -7201,7 +8405,7 @@
                 <a:ea typeface="Arial" charset="0"/>
                 <a:cs typeface="Arial" charset="0"/>
               </a:rPr>
-              <a:t>[1] https://www.behance.net/gallery/75855977/Drawing-Flatirons</a:t>
+              <a:t>Show web page</a:t>
             </a:r>
           </a:p>
           <a:p>
@@ -7222,30 +8426,577 @@
                 <a:ea typeface="Arial" charset="0"/>
                 <a:cs typeface="Arial" charset="0"/>
               </a:rPr>
-              <a:t>Bullet 2</a:t>
-            </a:r>
-          </a:p>
-          <a:p>
-            <a:pPr marL="342900" indent="-342900">
-              <a:lnSpc>
-                <a:spcPct val="150000"/>
-              </a:lnSpc>
-              <a:buSzPct val="80000"/>
-              <a:buFont typeface="Arial" charset="0"/>
-              <a:buChar char="•"/>
-            </a:pPr>
-            <a:r>
-              <a:rPr lang="en-US" sz="2000" dirty="0">
+              <a:t>Show CI/DI (update # of containers / update webpage contents) </a:t>
+            </a:r>
+          </a:p>
+        </p:txBody>
+      </p:sp>
+    </p:spTree>
+    <p:extLst>
+      <p:ext uri="{BB962C8B-B14F-4D97-AF65-F5344CB8AC3E}">
+        <p14:creationId xmlns:p14="http://schemas.microsoft.com/office/powerpoint/2010/main" val="2722990458"/>
+      </p:ext>
+    </p:extLst>
+  </p:cSld>
+  <p:clrMapOvr>
+    <a:masterClrMapping/>
+  </p:clrMapOvr>
+</p:sld>
+</file>
+
+<file path=ppt/slides/slide15.xml><?xml version="1.0" encoding="utf-8"?>
+<p:sld xmlns:a="http://schemas.openxmlformats.org/drawingml/2006/main" xmlns:r="http://schemas.openxmlformats.org/officeDocument/2006/relationships" xmlns:p="http://schemas.openxmlformats.org/presentationml/2006/main">
+  <p:cSld>
+    <p:bg>
+      <p:bgPr>
+        <a:blipFill dpi="0" rotWithShape="1">
+          <a:blip r:embed="rId2">
+            <a:lum/>
+          </a:blip>
+          <a:srcRect/>
+          <a:stretch>
+            <a:fillRect/>
+          </a:stretch>
+        </a:blipFill>
+        <a:effectLst/>
+      </p:bgPr>
+    </p:bg>
+    <p:spTree>
+      <p:nvGrpSpPr>
+        <p:cNvPr id="1" name=""/>
+        <p:cNvGrpSpPr/>
+        <p:nvPr/>
+      </p:nvGrpSpPr>
+      <p:grpSpPr>
+        <a:xfrm>
+          <a:off x="0" y="0"/>
+          <a:ext cx="0" cy="0"/>
+          <a:chOff x="0" y="0"/>
+          <a:chExt cx="0" cy="0"/>
+        </a:xfrm>
+      </p:grpSpPr>
+      <p:sp>
+        <p:nvSpPr>
+          <p:cNvPr id="4" name="TextBox 3"/>
+          <p:cNvSpPr txBox="1"/>
+          <p:nvPr/>
+        </p:nvSpPr>
+        <p:spPr>
+          <a:xfrm>
+            <a:off x="473230" y="442649"/>
+            <a:ext cx="6055586" cy="769441"/>
+          </a:xfrm>
+          <a:prstGeom prst="rect">
+            <a:avLst/>
+          </a:prstGeom>
+          <a:noFill/>
+        </p:spPr>
+        <p:txBody>
+          <a:bodyPr wrap="square" rtlCol="0">
+            <a:spAutoFit/>
+          </a:bodyPr>
+          <a:lstStyle/>
+          <a:p>
+            <a:r>
+              <a:rPr lang="en-US" sz="4400" dirty="0">
                 <a:solidFill>
-                  <a:schemeClr val="bg1"/>
+                  <a:srgbClr val="CFB87C"/>
                 </a:solidFill>
                 <a:latin typeface="Arial" charset="0"/>
                 <a:ea typeface="Arial" charset="0"/>
                 <a:cs typeface="Arial" charset="0"/>
               </a:rPr>
-              <a:t>Bullet 3</a:t>
-            </a:r>
-          </a:p>
+              <a:t>Future Work</a:t>
+            </a:r>
+          </a:p>
+        </p:txBody>
+      </p:sp>
+      <p:sp>
+        <p:nvSpPr>
+          <p:cNvPr id="5" name="TextBox 4"/>
+          <p:cNvSpPr txBox="1"/>
+          <p:nvPr/>
+        </p:nvSpPr>
+        <p:spPr>
+          <a:xfrm>
+            <a:off x="534190" y="1364943"/>
+            <a:ext cx="7280882" cy="2959208"/>
+          </a:xfrm>
+          <a:prstGeom prst="rect">
+            <a:avLst/>
+          </a:prstGeom>
+          <a:noFill/>
+        </p:spPr>
+        <p:txBody>
+          <a:bodyPr wrap="square" rtlCol="0">
+            <a:spAutoFit/>
+          </a:bodyPr>
+          <a:lstStyle/>
+          <a:p>
+            <a:r>
+              <a:rPr lang="en-US" sz="2000" b="1" dirty="0">
+                <a:solidFill>
+                  <a:schemeClr val="accent1">
+                    <a:lumMod val="10000"/>
+                  </a:schemeClr>
+                </a:solidFill>
+                <a:latin typeface="Arial" charset="0"/>
+                <a:ea typeface="Arial" charset="0"/>
+                <a:cs typeface="Arial" charset="0"/>
+              </a:rPr>
+              <a:t>Next up</a:t>
+            </a:r>
+          </a:p>
+          <a:p>
+            <a:endParaRPr lang="en-US" sz="2000" b="1" dirty="0">
+              <a:solidFill>
+                <a:schemeClr val="accent1">
+                  <a:lumMod val="10000"/>
+                </a:schemeClr>
+              </a:solidFill>
+              <a:latin typeface="Arial" charset="0"/>
+              <a:ea typeface="Arial" charset="0"/>
+              <a:cs typeface="Arial" charset="0"/>
+            </a:endParaRPr>
+          </a:p>
+          <a:p>
+            <a:pPr marL="342900" indent="-342900">
+              <a:lnSpc>
+                <a:spcPct val="150000"/>
+              </a:lnSpc>
+              <a:buFont typeface="Arial" charset="0"/>
+              <a:buChar char="•"/>
+            </a:pPr>
+            <a:r>
+              <a:rPr lang="en-US" sz="2000" dirty="0">
+                <a:solidFill>
+                  <a:schemeClr val="accent1">
+                    <a:lumMod val="10000"/>
+                  </a:schemeClr>
+                </a:solidFill>
+                <a:latin typeface="Arial" charset="0"/>
+                <a:ea typeface="Arial" charset="0"/>
+                <a:cs typeface="Arial" charset="0"/>
+              </a:rPr>
+              <a:t>User authentication (sign-in) to limit access to potentially sensitive data</a:t>
+            </a:r>
+          </a:p>
+          <a:p>
+            <a:pPr marL="342900" indent="-342900">
+              <a:lnSpc>
+                <a:spcPct val="150000"/>
+              </a:lnSpc>
+              <a:buFont typeface="Arial" charset="0"/>
+              <a:buChar char="•"/>
+            </a:pPr>
+            <a:r>
+              <a:rPr lang="en-US" sz="2000" dirty="0">
+                <a:solidFill>
+                  <a:schemeClr val="accent1">
+                    <a:lumMod val="10000"/>
+                  </a:schemeClr>
+                </a:solidFill>
+                <a:latin typeface="Arial" charset="0"/>
+                <a:ea typeface="Arial" charset="0"/>
+                <a:cs typeface="Arial" charset="0"/>
+              </a:rPr>
+              <a:t>Remote device authentication</a:t>
+            </a:r>
+          </a:p>
+          <a:p>
+            <a:pPr marL="342900" indent="-342900">
+              <a:lnSpc>
+                <a:spcPct val="150000"/>
+              </a:lnSpc>
+              <a:buFont typeface="Arial" charset="0"/>
+              <a:buChar char="•"/>
+            </a:pPr>
+            <a:r>
+              <a:rPr lang="en-US" sz="2000" dirty="0">
+                <a:solidFill>
+                  <a:schemeClr val="accent1">
+                    <a:lumMod val="10000"/>
+                  </a:schemeClr>
+                </a:solidFill>
+                <a:latin typeface="Arial" charset="0"/>
+                <a:ea typeface="Arial" charset="0"/>
+                <a:cs typeface="Arial" charset="0"/>
+              </a:rPr>
+              <a:t>Real time data/chart update (React?)</a:t>
+            </a:r>
+          </a:p>
+          <a:p>
+            <a:pPr marL="342900" indent="-342900">
+              <a:lnSpc>
+                <a:spcPct val="150000"/>
+              </a:lnSpc>
+              <a:buFont typeface="Arial" charset="0"/>
+              <a:buChar char="•"/>
+            </a:pPr>
+            <a:r>
+              <a:rPr lang="en-US" sz="2000" dirty="0">
+                <a:solidFill>
+                  <a:schemeClr val="accent1">
+                    <a:lumMod val="10000"/>
+                  </a:schemeClr>
+                </a:solidFill>
+                <a:latin typeface="Arial" charset="0"/>
+                <a:ea typeface="Arial" charset="0"/>
+                <a:cs typeface="Arial" charset="0"/>
+              </a:rPr>
+              <a:t>Implement tests for CI/DI pipeline</a:t>
+            </a:r>
+          </a:p>
+        </p:txBody>
+      </p:sp>
+      <p:sp>
+        <p:nvSpPr>
+          <p:cNvPr id="6" name="Rectangle 5"/>
+          <p:cNvSpPr/>
+          <p:nvPr/>
+        </p:nvSpPr>
+        <p:spPr>
+          <a:xfrm>
+            <a:off x="8001000" y="0"/>
+            <a:ext cx="4191000" cy="5943600"/>
+          </a:xfrm>
+          <a:prstGeom prst="rect">
+            <a:avLst/>
+          </a:prstGeom>
+          <a:solidFill>
+            <a:schemeClr val="bg2">
+              <a:lumMod val="90000"/>
+            </a:schemeClr>
+          </a:solidFill>
+          <a:ln>
+            <a:noFill/>
+          </a:ln>
+        </p:spPr>
+        <p:style>
+          <a:lnRef idx="1">
+            <a:schemeClr val="accent1"/>
+          </a:lnRef>
+          <a:fillRef idx="3">
+            <a:schemeClr val="accent1"/>
+          </a:fillRef>
+          <a:effectRef idx="2">
+            <a:schemeClr val="accent1"/>
+          </a:effectRef>
+          <a:fontRef idx="minor">
+            <a:schemeClr val="lt1"/>
+          </a:fontRef>
+        </p:style>
+        <p:txBody>
+          <a:bodyPr rtlCol="0" anchor="ctr"/>
+          <a:lstStyle/>
+          <a:p>
+            <a:pPr algn="ctr"/>
+            <a:endParaRPr lang="en-US"/>
+          </a:p>
+        </p:txBody>
+      </p:sp>
+      <p:pic>
+        <p:nvPicPr>
+          <p:cNvPr id="7" name="Picture 6">
+            <a:extLst>
+              <a:ext uri="{FF2B5EF4-FFF2-40B4-BE49-F238E27FC236}">
+                <a16:creationId xmlns:a16="http://schemas.microsoft.com/office/drawing/2014/main" id="{26714A95-5725-42D4-A3F4-191119F444E2}"/>
+              </a:ext>
+            </a:extLst>
+          </p:cNvPr>
+          <p:cNvPicPr>
+            <a:picLocks noChangeAspect="1"/>
+          </p:cNvPicPr>
+          <p:nvPr/>
+        </p:nvPicPr>
+        <p:blipFill rotWithShape="1">
+          <a:blip r:embed="rId3"/>
+          <a:srcRect t="-1" r="59853" b="13334"/>
+          <a:stretch/>
+        </p:blipFill>
+        <p:spPr>
+          <a:xfrm>
+            <a:off x="8001000" y="0"/>
+            <a:ext cx="4191000" cy="5943600"/>
+          </a:xfrm>
+          <a:prstGeom prst="rect">
+            <a:avLst/>
+          </a:prstGeom>
+        </p:spPr>
+      </p:pic>
+    </p:spTree>
+    <p:extLst>
+      <p:ext uri="{BB962C8B-B14F-4D97-AF65-F5344CB8AC3E}">
+        <p14:creationId xmlns:p14="http://schemas.microsoft.com/office/powerpoint/2010/main" val="1465794406"/>
+      </p:ext>
+    </p:extLst>
+  </p:cSld>
+  <p:clrMapOvr>
+    <a:masterClrMapping/>
+  </p:clrMapOvr>
+</p:sld>
+</file>
+
+<file path=ppt/slides/slide16.xml><?xml version="1.0" encoding="utf-8"?>
+<p:sld xmlns:a="http://schemas.openxmlformats.org/drawingml/2006/main" xmlns:r="http://schemas.openxmlformats.org/officeDocument/2006/relationships" xmlns:p="http://schemas.openxmlformats.org/presentationml/2006/main">
+  <p:cSld>
+    <p:bg>
+      <p:bgPr>
+        <a:blipFill dpi="0" rotWithShape="1">
+          <a:blip r:embed="rId2">
+            <a:lum/>
+          </a:blip>
+          <a:srcRect/>
+          <a:stretch>
+            <a:fillRect/>
+          </a:stretch>
+        </a:blipFill>
+        <a:effectLst/>
+      </p:bgPr>
+    </p:bg>
+    <p:spTree>
+      <p:nvGrpSpPr>
+        <p:cNvPr id="1" name=""/>
+        <p:cNvGrpSpPr/>
+        <p:nvPr/>
+      </p:nvGrpSpPr>
+      <p:grpSpPr>
+        <a:xfrm>
+          <a:off x="0" y="0"/>
+          <a:ext cx="0" cy="0"/>
+          <a:chOff x="0" y="0"/>
+          <a:chExt cx="0" cy="0"/>
+        </a:xfrm>
+      </p:grpSpPr>
+      <p:sp>
+        <p:nvSpPr>
+          <p:cNvPr id="4" name="Rectangle 3"/>
+          <p:cNvSpPr/>
+          <p:nvPr/>
+        </p:nvSpPr>
+        <p:spPr>
+          <a:xfrm>
+            <a:off x="0" y="0"/>
+            <a:ext cx="12192000" cy="6016692"/>
+          </a:xfrm>
+          <a:prstGeom prst="rect">
+            <a:avLst/>
+          </a:prstGeom>
+          <a:solidFill>
+            <a:schemeClr val="accent1">
+              <a:lumMod val="10000"/>
+            </a:schemeClr>
+          </a:solidFill>
+          <a:ln>
+            <a:noFill/>
+          </a:ln>
+        </p:spPr>
+        <p:style>
+          <a:lnRef idx="1">
+            <a:schemeClr val="accent1"/>
+          </a:lnRef>
+          <a:fillRef idx="3">
+            <a:schemeClr val="accent1"/>
+          </a:fillRef>
+          <a:effectRef idx="2">
+            <a:schemeClr val="accent1"/>
+          </a:effectRef>
+          <a:fontRef idx="minor">
+            <a:schemeClr val="lt1"/>
+          </a:fontRef>
+        </p:style>
+        <p:txBody>
+          <a:bodyPr rtlCol="0" anchor="ctr"/>
+          <a:lstStyle/>
+          <a:p>
+            <a:pPr algn="ctr"/>
+            <a:endParaRPr lang="en-US" dirty="0"/>
+          </a:p>
+        </p:txBody>
+      </p:sp>
+      <p:sp>
+        <p:nvSpPr>
+          <p:cNvPr id="7" name="TextBox 6"/>
+          <p:cNvSpPr txBox="1"/>
+          <p:nvPr/>
+        </p:nvSpPr>
+        <p:spPr>
+          <a:xfrm>
+            <a:off x="4690967" y="2615931"/>
+            <a:ext cx="2810066" cy="784830"/>
+          </a:xfrm>
+          <a:prstGeom prst="rect">
+            <a:avLst/>
+          </a:prstGeom>
+          <a:noFill/>
+        </p:spPr>
+        <p:txBody>
+          <a:bodyPr wrap="square" rtlCol="0">
+            <a:spAutoFit/>
+          </a:bodyPr>
+          <a:lstStyle/>
+          <a:p>
+            <a:r>
+              <a:rPr lang="en-US" sz="4500" dirty="0">
+                <a:solidFill>
+                  <a:srgbClr val="CFB87C"/>
+                </a:solidFill>
+                <a:latin typeface="Arial" charset="0"/>
+                <a:ea typeface="Arial" charset="0"/>
+                <a:cs typeface="Arial" charset="0"/>
+              </a:rPr>
+              <a:t>Questions</a:t>
+            </a:r>
+          </a:p>
+        </p:txBody>
+      </p:sp>
+    </p:spTree>
+    <p:extLst>
+      <p:ext uri="{BB962C8B-B14F-4D97-AF65-F5344CB8AC3E}">
+        <p14:creationId xmlns:p14="http://schemas.microsoft.com/office/powerpoint/2010/main" val="564888130"/>
+      </p:ext>
+    </p:extLst>
+  </p:cSld>
+  <p:clrMapOvr>
+    <a:masterClrMapping/>
+  </p:clrMapOvr>
+</p:sld>
+</file>
+
+<file path=ppt/slides/slide17.xml><?xml version="1.0" encoding="utf-8"?>
+<p:sld xmlns:a="http://schemas.openxmlformats.org/drawingml/2006/main" xmlns:r="http://schemas.openxmlformats.org/officeDocument/2006/relationships" xmlns:p="http://schemas.openxmlformats.org/presentationml/2006/main">
+  <p:cSld>
+    <p:bg>
+      <p:bgPr>
+        <a:blipFill dpi="0" rotWithShape="1">
+          <a:blip r:embed="rId2">
+            <a:lum/>
+          </a:blip>
+          <a:srcRect/>
+          <a:stretch>
+            <a:fillRect/>
+          </a:stretch>
+        </a:blipFill>
+        <a:effectLst/>
+      </p:bgPr>
+    </p:bg>
+    <p:spTree>
+      <p:nvGrpSpPr>
+        <p:cNvPr id="1" name=""/>
+        <p:cNvGrpSpPr/>
+        <p:nvPr/>
+      </p:nvGrpSpPr>
+      <p:grpSpPr>
+        <a:xfrm>
+          <a:off x="0" y="0"/>
+          <a:ext cx="0" cy="0"/>
+          <a:chOff x="0" y="0"/>
+          <a:chExt cx="0" cy="0"/>
+        </a:xfrm>
+      </p:grpSpPr>
+      <p:sp>
+        <p:nvSpPr>
+          <p:cNvPr id="4" name="Rectangle 3"/>
+          <p:cNvSpPr/>
+          <p:nvPr/>
+        </p:nvSpPr>
+        <p:spPr>
+          <a:xfrm>
+            <a:off x="0" y="0"/>
+            <a:ext cx="12192000" cy="6016692"/>
+          </a:xfrm>
+          <a:prstGeom prst="rect">
+            <a:avLst/>
+          </a:prstGeom>
+          <a:solidFill>
+            <a:schemeClr val="accent1">
+              <a:lumMod val="10000"/>
+            </a:schemeClr>
+          </a:solidFill>
+          <a:ln>
+            <a:noFill/>
+          </a:ln>
+        </p:spPr>
+        <p:style>
+          <a:lnRef idx="1">
+            <a:schemeClr val="accent1"/>
+          </a:lnRef>
+          <a:fillRef idx="3">
+            <a:schemeClr val="accent1"/>
+          </a:fillRef>
+          <a:effectRef idx="2">
+            <a:schemeClr val="accent1"/>
+          </a:effectRef>
+          <a:fontRef idx="minor">
+            <a:schemeClr val="lt1"/>
+          </a:fontRef>
+        </p:style>
+        <p:txBody>
+          <a:bodyPr rtlCol="0" anchor="ctr"/>
+          <a:lstStyle/>
+          <a:p>
+            <a:pPr algn="ctr"/>
+            <a:endParaRPr lang="en-US" dirty="0"/>
+          </a:p>
+        </p:txBody>
+      </p:sp>
+      <p:sp>
+        <p:nvSpPr>
+          <p:cNvPr id="7" name="TextBox 6"/>
+          <p:cNvSpPr txBox="1"/>
+          <p:nvPr/>
+        </p:nvSpPr>
+        <p:spPr>
+          <a:xfrm>
+            <a:off x="442180" y="406073"/>
+            <a:ext cx="11559320" cy="784830"/>
+          </a:xfrm>
+          <a:prstGeom prst="rect">
+            <a:avLst/>
+          </a:prstGeom>
+          <a:noFill/>
+        </p:spPr>
+        <p:txBody>
+          <a:bodyPr wrap="square" rtlCol="0">
+            <a:spAutoFit/>
+          </a:bodyPr>
+          <a:lstStyle/>
+          <a:p>
+            <a:r>
+              <a:rPr lang="en-US" sz="4500" dirty="0">
+                <a:solidFill>
+                  <a:srgbClr val="CFB87C"/>
+                </a:solidFill>
+                <a:latin typeface="Arial" charset="0"/>
+                <a:ea typeface="Arial" charset="0"/>
+                <a:cs typeface="Arial" charset="0"/>
+              </a:rPr>
+              <a:t>Citations</a:t>
+            </a:r>
+          </a:p>
+        </p:txBody>
+      </p:sp>
+      <p:sp>
+        <p:nvSpPr>
+          <p:cNvPr id="8" name="TextBox 7"/>
+          <p:cNvSpPr txBox="1"/>
+          <p:nvPr/>
+        </p:nvSpPr>
+        <p:spPr>
+          <a:xfrm>
+            <a:off x="530874" y="1383408"/>
+            <a:ext cx="10626410" cy="2343655"/>
+          </a:xfrm>
+          <a:prstGeom prst="rect">
+            <a:avLst/>
+          </a:prstGeom>
+          <a:noFill/>
+        </p:spPr>
+        <p:txBody>
+          <a:bodyPr wrap="square" numCol="1" rtlCol="0">
+            <a:spAutoFit/>
+          </a:bodyPr>
+          <a:lstStyle/>
           <a:p>
             <a:pPr marL="342900" indent="-342900">
               <a:lnSpc>
@@ -7264,12 +9015,113 @@
               <a:cs typeface="Arial" charset="0"/>
             </a:endParaRPr>
           </a:p>
+          <a:p>
+            <a:pPr marL="342900" indent="-342900">
+              <a:lnSpc>
+                <a:spcPct val="150000"/>
+              </a:lnSpc>
+              <a:buSzPct val="80000"/>
+              <a:buFont typeface="Arial" charset="0"/>
+              <a:buChar char="•"/>
+            </a:pPr>
+            <a:r>
+              <a:rPr lang="en-US" sz="2000" dirty="0">
+                <a:solidFill>
+                  <a:schemeClr val="bg1"/>
+                </a:solidFill>
+                <a:latin typeface="Arial" charset="0"/>
+                <a:ea typeface="Arial" charset="0"/>
+                <a:cs typeface="Arial" charset="0"/>
+              </a:rPr>
+              <a:t>[1] </a:t>
+            </a:r>
+            <a:r>
+              <a:rPr lang="en-US" sz="2000" dirty="0">
+                <a:solidFill>
+                  <a:schemeClr val="bg1"/>
+                </a:solidFill>
+                <a:latin typeface="Arial" charset="0"/>
+                <a:ea typeface="Arial" charset="0"/>
+                <a:cs typeface="Arial" charset="0"/>
+                <a:hlinkClick r:id="rId3"/>
+              </a:rPr>
+              <a:t>https://www.behance.net/gallery/75855977/Drawing-Flatirons</a:t>
+            </a:r>
+            <a:endParaRPr lang="en-US" sz="2000" dirty="0">
+              <a:solidFill>
+                <a:schemeClr val="bg1"/>
+              </a:solidFill>
+              <a:latin typeface="Arial" charset="0"/>
+              <a:ea typeface="Arial" charset="0"/>
+              <a:cs typeface="Arial" charset="0"/>
+            </a:endParaRPr>
+          </a:p>
+          <a:p>
+            <a:pPr marL="342900" indent="-342900">
+              <a:lnSpc>
+                <a:spcPct val="150000"/>
+              </a:lnSpc>
+              <a:buSzPct val="80000"/>
+              <a:buFont typeface="Arial" charset="0"/>
+              <a:buChar char="•"/>
+            </a:pPr>
+            <a:r>
+              <a:rPr lang="en-US" sz="2000" dirty="0">
+                <a:solidFill>
+                  <a:schemeClr val="bg1"/>
+                </a:solidFill>
+                <a:latin typeface="Arial" charset="0"/>
+                <a:ea typeface="Arial" charset="0"/>
+                <a:cs typeface="Arial" charset="0"/>
+              </a:rPr>
+              <a:t>Website IP: http://34.71.145.113/</a:t>
+            </a:r>
+          </a:p>
+          <a:p>
+            <a:pPr marL="342900" indent="-342900">
+              <a:lnSpc>
+                <a:spcPct val="150000"/>
+              </a:lnSpc>
+              <a:buSzPct val="80000"/>
+              <a:buFont typeface="Arial" charset="0"/>
+              <a:buChar char="•"/>
+            </a:pPr>
+            <a:r>
+              <a:rPr lang="en-US" sz="2000" dirty="0">
+                <a:solidFill>
+                  <a:schemeClr val="bg1"/>
+                </a:solidFill>
+                <a:latin typeface="Arial" charset="0"/>
+                <a:ea typeface="Arial" charset="0"/>
+                <a:cs typeface="Arial" charset="0"/>
+              </a:rPr>
+              <a:t>Code Repo: https://github.com/armando-jp/ecen5033-devops-final </a:t>
+            </a:r>
+          </a:p>
+          <a:p>
+            <a:pPr marL="342900" indent="-342900">
+              <a:lnSpc>
+                <a:spcPct val="150000"/>
+              </a:lnSpc>
+              <a:buSzPct val="80000"/>
+              <a:buFont typeface="Arial" charset="0"/>
+              <a:buChar char="•"/>
+            </a:pPr>
+            <a:endParaRPr lang="en-US" sz="2000" dirty="0">
+              <a:solidFill>
+                <a:schemeClr val="bg1"/>
+              </a:solidFill>
+              <a:latin typeface="Arial" charset="0"/>
+              <a:ea typeface="Arial" charset="0"/>
+              <a:cs typeface="Arial" charset="0"/>
+            </a:endParaRPr>
+          </a:p>
         </p:txBody>
       </p:sp>
     </p:spTree>
     <p:extLst>
       <p:ext uri="{BB962C8B-B14F-4D97-AF65-F5344CB8AC3E}">
-        <p14:creationId xmlns:p14="http://schemas.microsoft.com/office/powerpoint/2010/main" val="2691050930"/>
+        <p14:creationId xmlns:p14="http://schemas.microsoft.com/office/powerpoint/2010/main" val="483346507"/>
       </p:ext>
     </p:extLst>
   </p:cSld>
@@ -7355,7 +9207,7 @@
         <p:spPr>
           <a:xfrm>
             <a:off x="530874" y="1383408"/>
-            <a:ext cx="10626410" cy="3170099"/>
+            <a:ext cx="10626410" cy="3631763"/>
           </a:xfrm>
           <a:prstGeom prst="rect">
             <a:avLst/>
@@ -7476,7 +9328,30 @@
                 <a:ea typeface="Arial" charset="0"/>
                 <a:cs typeface="Arial" charset="0"/>
               </a:rPr>
-              <a:t>Video Demo</a:t>
+              <a:t>CI/CD</a:t>
+            </a:r>
+          </a:p>
+          <a:p>
+            <a:pPr marL="342900" indent="-342900">
+              <a:lnSpc>
+                <a:spcPct val="150000"/>
+              </a:lnSpc>
+              <a:buSzPct val="80000"/>
+              <a:buFont typeface="Arial" charset="0"/>
+              <a:buChar char="•"/>
+            </a:pPr>
+            <a:r>
+              <a:rPr lang="en-US" sz="2000" dirty="0">
+                <a:solidFill>
+                  <a:schemeClr val="bg2">
+                    <a:lumMod val="10000"/>
+                  </a:schemeClr>
+                </a:solidFill>
+                <a:latin typeface="Arial" charset="0"/>
+                <a:ea typeface="Arial" charset="0"/>
+                <a:cs typeface="Arial" charset="0"/>
+              </a:rPr>
+              <a:t>Live Demo</a:t>
             </a:r>
           </a:p>
           <a:p>
@@ -7610,7 +9485,7 @@
         <p:spPr>
           <a:xfrm>
             <a:off x="534190" y="1364943"/>
-            <a:ext cx="7280882" cy="2092881"/>
+            <a:ext cx="7280882" cy="2035878"/>
           </a:xfrm>
           <a:prstGeom prst="rect">
             <a:avLst/>
@@ -7634,7 +9509,7 @@
                 <a:ea typeface="Arial" charset="0"/>
                 <a:cs typeface="Arial" charset="0"/>
               </a:rPr>
-              <a:t>What is this?</a:t>
+              <a:t>Embedded Device Service?</a:t>
             </a:r>
           </a:p>
           <a:p>
@@ -7668,31 +9543,8 @@
                 <a:ea typeface="Arial" charset="0"/>
                 <a:cs typeface="Arial" charset="0"/>
               </a:rPr>
-              <a:t>Platform for monitoring IoT </a:t>
-            </a:r>
-            <a:r>
-              <a:rPr lang="en-US" sz="2000">
-                <a:solidFill>
-                  <a:schemeClr val="accent1">
-                    <a:lumMod val="10000"/>
-                  </a:schemeClr>
-                </a:solidFill>
-                <a:latin typeface="Arial" charset="0"/>
-                <a:ea typeface="Arial" charset="0"/>
-                <a:cs typeface="Arial" charset="0"/>
-              </a:rPr>
-              <a:t>device data.</a:t>
-            </a:r>
-            <a:endParaRPr lang="en-US" sz="2000" dirty="0">
-              <a:solidFill>
-                <a:schemeClr val="accent1">
-                  <a:lumMod val="10000"/>
-                </a:schemeClr>
-              </a:solidFill>
-              <a:latin typeface="Arial" charset="0"/>
-              <a:ea typeface="Arial" charset="0"/>
-              <a:cs typeface="Arial" charset="0"/>
-            </a:endParaRPr>
+              <a:t>Platform for remotely monitoring IoT device data</a:t>
+            </a:r>
           </a:p>
           <a:p>
             <a:pPr marL="342900" indent="-342900">
@@ -7713,7 +9565,7 @@
                 <a:ea typeface="Arial" charset="0"/>
                 <a:cs typeface="Arial" charset="0"/>
               </a:rPr>
-              <a:t>Must be viewable through web browser.</a:t>
+              <a:t>Accessible from any device with web browser</a:t>
             </a:r>
           </a:p>
           <a:p>
@@ -7735,7 +9587,7 @@
                 <a:ea typeface="Arial" charset="0"/>
                 <a:cs typeface="Arial" charset="0"/>
               </a:rPr>
-              <a:t>Bullet 3</a:t>
+              <a:t>Built using K8s and hosted on Google Cloud</a:t>
             </a:r>
           </a:p>
         </p:txBody>
@@ -7786,6 +9638,51 @@
           </a:p>
         </p:txBody>
       </p:sp>
+      <p:pic>
+        <p:nvPicPr>
+          <p:cNvPr id="2050" name="Picture 2">
+            <a:extLst>
+              <a:ext uri="{FF2B5EF4-FFF2-40B4-BE49-F238E27FC236}">
+                <a16:creationId xmlns:a16="http://schemas.microsoft.com/office/drawing/2014/main" id="{4D11B408-F92C-4A43-8C33-BF7A7F5EED75}"/>
+              </a:ext>
+            </a:extLst>
+          </p:cNvPr>
+          <p:cNvPicPr>
+            <a:picLocks noChangeAspect="1" noChangeArrowheads="1"/>
+          </p:cNvPicPr>
+          <p:nvPr/>
+        </p:nvPicPr>
+        <p:blipFill rotWithShape="1">
+          <a:blip r:embed="rId3">
+            <a:extLst>
+              <a:ext uri="{28A0092B-C50C-407E-A947-70E740481C1C}">
+                <a14:useLocalDpi xmlns:a14="http://schemas.microsoft.com/office/drawing/2010/main" val="0"/>
+              </a:ext>
+            </a:extLst>
+          </a:blip>
+          <a:srcRect l="15895" r="27757"/>
+          <a:stretch/>
+        </p:blipFill>
+        <p:spPr bwMode="auto">
+          <a:xfrm>
+            <a:off x="8008049" y="0"/>
+            <a:ext cx="4191000" cy="5943600"/>
+          </a:xfrm>
+          <a:prstGeom prst="rect">
+            <a:avLst/>
+          </a:prstGeom>
+          <a:noFill/>
+          <a:extLst>
+            <a:ext uri="{909E8E84-426E-40DD-AFC4-6F175D3DCCD1}">
+              <a14:hiddenFill xmlns:a14="http://schemas.microsoft.com/office/drawing/2010/main">
+                <a:solidFill>
+                  <a:srgbClr val="FFFFFF"/>
+                </a:solidFill>
+              </a14:hiddenFill>
+            </a:ext>
+          </a:extLst>
+        </p:spPr>
+      </p:pic>
     </p:spTree>
     <p:extLst>
       <p:ext uri="{BB962C8B-B14F-4D97-AF65-F5344CB8AC3E}">
@@ -7921,7 +9818,7 @@
         <p:spPr>
           <a:xfrm>
             <a:off x="530874" y="1383408"/>
-            <a:ext cx="10626410" cy="2400657"/>
+            <a:ext cx="10626410" cy="496996"/>
           </a:xfrm>
           <a:prstGeom prst="rect">
             <a:avLst/>
@@ -7934,31 +9831,11 @@
           </a:bodyPr>
           <a:lstStyle/>
           <a:p>
-            <a:pPr marL="342900" indent="-342900">
+            <a:pPr>
               <a:lnSpc>
                 <a:spcPct val="150000"/>
               </a:lnSpc>
               <a:buSzPct val="80000"/>
-              <a:buFont typeface="Arial" charset="0"/>
-              <a:buChar char="•"/>
-            </a:pPr>
-            <a:endParaRPr lang="en-US" sz="2000" b="1" dirty="0">
-              <a:solidFill>
-                <a:schemeClr val="bg1"/>
-              </a:solidFill>
-              <a:latin typeface="Arial" charset="0"/>
-              <a:ea typeface="Arial" charset="0"/>
-              <a:cs typeface="Arial" charset="0"/>
-            </a:endParaRPr>
-          </a:p>
-          <a:p>
-            <a:pPr marL="342900" indent="-342900">
-              <a:lnSpc>
-                <a:spcPct val="150000"/>
-              </a:lnSpc>
-              <a:buSzPct val="80000"/>
-              <a:buFont typeface="Arial" charset="0"/>
-              <a:buChar char="•"/>
             </a:pPr>
             <a:r>
               <a:rPr lang="en-US" sz="2000" dirty="0">
@@ -7969,77 +9846,17 @@
                 <a:ea typeface="Arial" charset="0"/>
                 <a:cs typeface="Arial" charset="0"/>
               </a:rPr>
-              <a:t>Bullet 1</a:t>
-            </a:r>
-          </a:p>
-          <a:p>
-            <a:pPr marL="342900" indent="-342900">
-              <a:lnSpc>
-                <a:spcPct val="150000"/>
-              </a:lnSpc>
-              <a:buSzPct val="80000"/>
-              <a:buFont typeface="Arial" charset="0"/>
-              <a:buChar char="•"/>
-            </a:pPr>
-            <a:r>
-              <a:rPr lang="en-US" sz="2000" dirty="0">
-                <a:solidFill>
-                  <a:schemeClr val="bg1"/>
-                </a:solidFill>
-                <a:latin typeface="Arial" charset="0"/>
-                <a:ea typeface="Arial" charset="0"/>
-                <a:cs typeface="Arial" charset="0"/>
-              </a:rPr>
-              <a:t>Bullet 2</a:t>
-            </a:r>
-          </a:p>
-          <a:p>
-            <a:pPr marL="342900" indent="-342900">
-              <a:lnSpc>
-                <a:spcPct val="150000"/>
-              </a:lnSpc>
-              <a:buSzPct val="80000"/>
-              <a:buFont typeface="Arial" charset="0"/>
-              <a:buChar char="•"/>
-            </a:pPr>
-            <a:r>
-              <a:rPr lang="en-US" sz="2000" dirty="0">
-                <a:solidFill>
-                  <a:schemeClr val="bg1"/>
-                </a:solidFill>
-                <a:latin typeface="Arial" charset="0"/>
-                <a:ea typeface="Arial" charset="0"/>
-                <a:cs typeface="Arial" charset="0"/>
-              </a:rPr>
-              <a:t>Bullet 3</a:t>
-            </a:r>
-          </a:p>
-          <a:p>
-            <a:pPr marL="342900" indent="-342900">
-              <a:lnSpc>
-                <a:spcPct val="150000"/>
-              </a:lnSpc>
-              <a:buSzPct val="80000"/>
-              <a:buFont typeface="Arial" charset="0"/>
-              <a:buChar char="•"/>
-            </a:pPr>
-            <a:endParaRPr lang="en-US" sz="2000" dirty="0">
-              <a:solidFill>
-                <a:schemeClr val="bg1"/>
-              </a:solidFill>
-              <a:latin typeface="Arial" charset="0"/>
-              <a:ea typeface="Arial" charset="0"/>
-              <a:cs typeface="Arial" charset="0"/>
-            </a:endParaRPr>
+              <a:t>Simplified view of local/dev machine solution architecture.  </a:t>
+            </a:r>
           </a:p>
         </p:txBody>
       </p:sp>
       <p:pic>
         <p:nvPicPr>
-          <p:cNvPr id="3" name="Picture 2" descr="Diagram&#10;&#10;Description automatically generated">
+          <p:cNvPr id="11" name="Picture 10" descr="Diagram&#10;&#10;Description automatically generated">
             <a:extLst>
               <a:ext uri="{FF2B5EF4-FFF2-40B4-BE49-F238E27FC236}">
-                <a16:creationId xmlns:a16="http://schemas.microsoft.com/office/drawing/2014/main" id="{A9C463E5-0C94-456C-9CBB-CEDED5DF4DD9}"/>
+                <a16:creationId xmlns:a16="http://schemas.microsoft.com/office/drawing/2014/main" id="{83FB454D-CD35-434C-8A14-85EF51DDA736}"/>
               </a:ext>
             </a:extLst>
           </p:cNvPr>
@@ -8056,8 +9873,8 @@
         </p:blipFill>
         <p:spPr>
           <a:xfrm>
-            <a:off x="1157287" y="1988602"/>
-            <a:ext cx="9877425" cy="3590925"/>
+            <a:off x="905366" y="2224523"/>
+            <a:ext cx="9877425" cy="3448050"/>
           </a:xfrm>
           <a:prstGeom prst="rect">
             <a:avLst/>
@@ -8110,21 +9927,290 @@
       </p:grpSpPr>
       <p:sp>
         <p:nvSpPr>
-          <p:cNvPr id="4" name="Rectangle 3"/>
+          <p:cNvPr id="7" name="TextBox 6"/>
+          <p:cNvSpPr txBox="1"/>
+          <p:nvPr/>
+        </p:nvSpPr>
+        <p:spPr>
+          <a:xfrm>
+            <a:off x="4386862" y="442649"/>
+            <a:ext cx="8670770" cy="769441"/>
+          </a:xfrm>
+          <a:prstGeom prst="rect">
+            <a:avLst/>
+          </a:prstGeom>
+          <a:noFill/>
+        </p:spPr>
+        <p:txBody>
+          <a:bodyPr wrap="square" rtlCol="0">
+            <a:spAutoFit/>
+          </a:bodyPr>
+          <a:lstStyle/>
+          <a:p>
+            <a:r>
+              <a:rPr lang="en-US" sz="4400" dirty="0">
+                <a:solidFill>
+                  <a:srgbClr val="CFB87C"/>
+                </a:solidFill>
+                <a:latin typeface="Arial" charset="0"/>
+                <a:ea typeface="Arial" charset="0"/>
+                <a:cs typeface="Arial" charset="0"/>
+              </a:rPr>
+              <a:t>Architecture</a:t>
+            </a:r>
+          </a:p>
+        </p:txBody>
+      </p:sp>
+      <p:sp>
+        <p:nvSpPr>
+          <p:cNvPr id="8" name="TextBox 7"/>
+          <p:cNvSpPr txBox="1"/>
+          <p:nvPr/>
+        </p:nvSpPr>
+        <p:spPr>
+          <a:xfrm>
+            <a:off x="4478301" y="1444191"/>
+            <a:ext cx="7487825" cy="4308872"/>
+          </a:xfrm>
+          <a:prstGeom prst="rect">
+            <a:avLst/>
+          </a:prstGeom>
+          <a:noFill/>
+        </p:spPr>
+        <p:txBody>
+          <a:bodyPr wrap="square" rtlCol="0">
+            <a:spAutoFit/>
+          </a:bodyPr>
+          <a:lstStyle/>
+          <a:p>
+            <a:r>
+              <a:rPr lang="en-US" sz="2400" b="1" dirty="0">
+                <a:solidFill>
+                  <a:srgbClr val="CFB87C"/>
+                </a:solidFill>
+                <a:latin typeface="Arial" charset="0"/>
+                <a:ea typeface="Arial" charset="0"/>
+                <a:cs typeface="Arial" charset="0"/>
+              </a:rPr>
+              <a:t>Server</a:t>
+            </a:r>
+          </a:p>
+          <a:p>
+            <a:pPr marL="342900" indent="-342900">
+              <a:buFont typeface="Wingdings" charset="2"/>
+              <a:buChar char="§"/>
+            </a:pPr>
+            <a:endParaRPr lang="en-US" sz="2000" dirty="0">
+              <a:solidFill>
+                <a:schemeClr val="accent1">
+                  <a:lumMod val="10000"/>
+                </a:schemeClr>
+              </a:solidFill>
+              <a:latin typeface="Arial" charset="0"/>
+              <a:ea typeface="Arial" charset="0"/>
+              <a:cs typeface="Arial" charset="0"/>
+            </a:endParaRPr>
+          </a:p>
+          <a:p>
+            <a:pPr marL="342900" indent="-342900">
+              <a:lnSpc>
+                <a:spcPct val="150000"/>
+              </a:lnSpc>
+              <a:buSzPct val="85000"/>
+              <a:buFont typeface="Arial" charset="0"/>
+              <a:buChar char="•"/>
+            </a:pPr>
+            <a:r>
+              <a:rPr lang="en-US" sz="2000" dirty="0">
+                <a:solidFill>
+                  <a:schemeClr val="accent1">
+                    <a:lumMod val="10000"/>
+                  </a:schemeClr>
+                </a:solidFill>
+                <a:latin typeface="Arial" charset="0"/>
+                <a:ea typeface="Arial" charset="0"/>
+                <a:cs typeface="Arial" charset="0"/>
+              </a:rPr>
+              <a:t>Implemented in JavaScript (JS)</a:t>
+            </a:r>
+          </a:p>
+          <a:p>
+            <a:pPr marL="342900" indent="-342900">
+              <a:lnSpc>
+                <a:spcPct val="150000"/>
+              </a:lnSpc>
+              <a:buSzPct val="85000"/>
+              <a:buFont typeface="Arial" charset="0"/>
+              <a:buChar char="•"/>
+            </a:pPr>
+            <a:r>
+              <a:rPr lang="en-US" sz="2000" dirty="0">
+                <a:solidFill>
+                  <a:schemeClr val="accent1">
+                    <a:lumMod val="10000"/>
+                  </a:schemeClr>
+                </a:solidFill>
+                <a:latin typeface="Arial" charset="0"/>
+                <a:ea typeface="Arial" charset="0"/>
+                <a:cs typeface="Arial" charset="0"/>
+              </a:rPr>
+              <a:t>Other Technologies Utilized:</a:t>
+            </a:r>
+          </a:p>
+          <a:p>
+            <a:pPr marL="800100" lvl="1" indent="-342900">
+              <a:lnSpc>
+                <a:spcPct val="150000"/>
+              </a:lnSpc>
+              <a:buSzPct val="85000"/>
+              <a:buFont typeface="Arial" charset="0"/>
+              <a:buChar char="•"/>
+            </a:pPr>
+            <a:r>
+              <a:rPr lang="en-US" sz="2000" dirty="0">
+                <a:solidFill>
+                  <a:schemeClr val="accent1">
+                    <a:lumMod val="10000"/>
+                  </a:schemeClr>
+                </a:solidFill>
+                <a:latin typeface="Arial" charset="0"/>
+                <a:ea typeface="Arial" charset="0"/>
+                <a:cs typeface="Arial" charset="0"/>
+              </a:rPr>
+              <a:t>Node.js (backend JS runtime environment)</a:t>
+            </a:r>
+          </a:p>
+          <a:p>
+            <a:pPr marL="800100" lvl="1" indent="-342900">
+              <a:lnSpc>
+                <a:spcPct val="150000"/>
+              </a:lnSpc>
+              <a:buSzPct val="85000"/>
+              <a:buFont typeface="Arial" charset="0"/>
+              <a:buChar char="•"/>
+            </a:pPr>
+            <a:r>
+              <a:rPr lang="en-US" sz="2000" dirty="0">
+                <a:solidFill>
+                  <a:schemeClr val="accent1">
+                    <a:lumMod val="10000"/>
+                  </a:schemeClr>
+                </a:solidFill>
+                <a:latin typeface="Arial" charset="0"/>
+                <a:ea typeface="Arial" charset="0"/>
+                <a:cs typeface="Arial" charset="0"/>
+              </a:rPr>
+              <a:t>Express (backend web app framework)</a:t>
+            </a:r>
+          </a:p>
+          <a:p>
+            <a:pPr marL="800100" lvl="1" indent="-342900">
+              <a:lnSpc>
+                <a:spcPct val="150000"/>
+              </a:lnSpc>
+              <a:buSzPct val="85000"/>
+              <a:buFont typeface="Arial" charset="0"/>
+              <a:buChar char="•"/>
+            </a:pPr>
+            <a:r>
+              <a:rPr lang="en-US" sz="2000" dirty="0">
+                <a:solidFill>
+                  <a:schemeClr val="accent1">
+                    <a:lumMod val="10000"/>
+                  </a:schemeClr>
+                </a:solidFill>
+                <a:latin typeface="Arial" charset="0"/>
+                <a:ea typeface="Arial" charset="0"/>
+                <a:cs typeface="Arial" charset="0"/>
+              </a:rPr>
+              <a:t>EJS (templating engine)</a:t>
+            </a:r>
+          </a:p>
+          <a:p>
+            <a:pPr marL="342900" indent="-342900">
+              <a:lnSpc>
+                <a:spcPct val="150000"/>
+              </a:lnSpc>
+              <a:buSzPct val="85000"/>
+              <a:buFont typeface="Arial" charset="0"/>
+              <a:buChar char="•"/>
+            </a:pPr>
+            <a:r>
+              <a:rPr lang="en-US" sz="2000" dirty="0">
+                <a:solidFill>
+                  <a:schemeClr val="accent1">
+                    <a:lumMod val="10000"/>
+                  </a:schemeClr>
+                </a:solidFill>
+                <a:latin typeface="Arial" charset="0"/>
+                <a:ea typeface="Arial" charset="0"/>
+                <a:cs typeface="Arial" charset="0"/>
+              </a:rPr>
+              <a:t>Running in </a:t>
+            </a:r>
+            <a:r>
+              <a:rPr lang="en-US" sz="2000" dirty="0">
+                <a:solidFill>
+                  <a:schemeClr val="accent1"/>
+                </a:solidFill>
+                <a:latin typeface="Arial" charset="0"/>
+                <a:ea typeface="Arial" charset="0"/>
+                <a:cs typeface="Arial" charset="0"/>
+              </a:rPr>
+              <a:t>Node Docker image</a:t>
+            </a:r>
+          </a:p>
+          <a:p>
+            <a:pPr marL="800100" lvl="1" indent="-342900">
+              <a:lnSpc>
+                <a:spcPct val="150000"/>
+              </a:lnSpc>
+              <a:buSzPct val="85000"/>
+              <a:buFont typeface="Arial" charset="0"/>
+              <a:buChar char="•"/>
+            </a:pPr>
+            <a:endParaRPr lang="en-US" sz="2000" dirty="0">
+              <a:solidFill>
+                <a:schemeClr val="accent1">
+                  <a:lumMod val="10000"/>
+                </a:schemeClr>
+              </a:solidFill>
+              <a:latin typeface="Arial" charset="0"/>
+              <a:ea typeface="Arial" charset="0"/>
+              <a:cs typeface="Arial" charset="0"/>
+            </a:endParaRPr>
+          </a:p>
+          <a:p>
+            <a:endParaRPr lang="en-US" sz="2000" dirty="0">
+              <a:solidFill>
+                <a:schemeClr val="accent1">
+                  <a:lumMod val="10000"/>
+                </a:schemeClr>
+              </a:solidFill>
+              <a:latin typeface="Arial" charset="0"/>
+              <a:ea typeface="Arial" charset="0"/>
+              <a:cs typeface="Arial" charset="0"/>
+            </a:endParaRPr>
+          </a:p>
+        </p:txBody>
+      </p:sp>
+      <p:sp>
+        <p:nvSpPr>
+          <p:cNvPr id="9" name="Rectangle 8"/>
           <p:cNvSpPr/>
           <p:nvPr/>
         </p:nvSpPr>
         <p:spPr>
           <a:xfrm>
             <a:off x="0" y="0"/>
-            <a:ext cx="12192000" cy="6016692"/>
+            <a:ext cx="4224528" cy="5943600"/>
           </a:xfrm>
           <a:prstGeom prst="rect">
             <a:avLst/>
           </a:prstGeom>
           <a:solidFill>
-            <a:schemeClr val="accent1">
-              <a:lumMod val="10000"/>
+            <a:schemeClr val="bg2">
+              <a:lumMod val="90000"/>
             </a:schemeClr>
           </a:solidFill>
           <a:ln>
@@ -8150,53 +10236,110 @@
           <a:lstStyle/>
           <a:p>
             <a:pPr algn="ctr"/>
-            <a:endParaRPr lang="en-US" dirty="0"/>
+            <a:endParaRPr lang="en-US"/>
           </a:p>
         </p:txBody>
       </p:sp>
-      <p:sp>
-        <p:nvSpPr>
-          <p:cNvPr id="10" name="TextBox 9"/>
-          <p:cNvSpPr txBox="1"/>
+      <p:pic>
+        <p:nvPicPr>
+          <p:cNvPr id="1026" name="Picture 2">
+            <a:extLst>
+              <a:ext uri="{FF2B5EF4-FFF2-40B4-BE49-F238E27FC236}">
+                <a16:creationId xmlns:a16="http://schemas.microsoft.com/office/drawing/2014/main" id="{D6D28697-0444-4E33-85A5-921ED2E63229}"/>
+              </a:ext>
+            </a:extLst>
+          </p:cNvPr>
+          <p:cNvPicPr>
+            <a:picLocks noChangeAspect="1" noChangeArrowheads="1"/>
+          </p:cNvPicPr>
           <p:nvPr/>
-        </p:nvSpPr>
-        <p:spPr>
+        </p:nvPicPr>
+        <p:blipFill>
+          <a:blip r:embed="rId3">
+            <a:extLst>
+              <a:ext uri="{28A0092B-C50C-407E-A947-70E740481C1C}">
+                <a14:useLocalDpi xmlns:a14="http://schemas.microsoft.com/office/drawing/2010/main" val="0"/>
+              </a:ext>
+            </a:extLst>
+          </a:blip>
+          <a:srcRect/>
+          <a:stretch>
+            <a:fillRect/>
+          </a:stretch>
+        </p:blipFill>
+        <p:spPr bwMode="auto">
           <a:xfrm>
-            <a:off x="337676" y="441016"/>
-            <a:ext cx="11559320" cy="830997"/>
+            <a:off x="225874" y="202872"/>
+            <a:ext cx="1122976" cy="1122976"/>
           </a:xfrm>
           <a:prstGeom prst="rect">
             <a:avLst/>
           </a:prstGeom>
           <a:noFill/>
+          <a:extLst>
+            <a:ext uri="{909E8E84-426E-40DD-AFC4-6F175D3DCCD1}">
+              <a14:hiddenFill xmlns:a14="http://schemas.microsoft.com/office/drawing/2010/main">
+                <a:solidFill>
+                  <a:srgbClr val="FFFFFF"/>
+                </a:solidFill>
+              </a14:hiddenFill>
+            </a:ext>
+          </a:extLst>
         </p:spPr>
-        <p:txBody>
-          <a:bodyPr wrap="square" rtlCol="0">
-            <a:spAutoFit/>
-          </a:bodyPr>
-          <a:lstStyle/>
-          <a:p>
-            <a:pPr algn="ctr"/>
-            <a:r>
-              <a:rPr lang="en-US" sz="4800" dirty="0">
-                <a:solidFill>
-                  <a:srgbClr val="CFB87C"/>
-                </a:solidFill>
-                <a:latin typeface="Arial" charset="0"/>
-                <a:ea typeface="Arial" charset="0"/>
-                <a:cs typeface="Arial" charset="0"/>
-              </a:rPr>
-              <a:t>Architecture</a:t>
-            </a:r>
-          </a:p>
-        </p:txBody>
-      </p:sp>
+      </p:pic>
       <p:pic>
         <p:nvPicPr>
-          <p:cNvPr id="3" name="Picture 2" descr="Graphical user interface, application&#10;&#10;Description automatically generated">
+          <p:cNvPr id="1028" name="Picture 4">
             <a:extLst>
               <a:ext uri="{FF2B5EF4-FFF2-40B4-BE49-F238E27FC236}">
-                <a16:creationId xmlns:a16="http://schemas.microsoft.com/office/drawing/2014/main" id="{E179A619-AF31-4799-B52B-AFC779A89FDF}"/>
+                <a16:creationId xmlns:a16="http://schemas.microsoft.com/office/drawing/2014/main" id="{D3061615-B725-417F-86BA-23FDB2351105}"/>
+              </a:ext>
+            </a:extLst>
+          </p:cNvPr>
+          <p:cNvPicPr>
+            <a:picLocks noChangeAspect="1" noChangeArrowheads="1"/>
+          </p:cNvPicPr>
+          <p:nvPr/>
+        </p:nvPicPr>
+        <p:blipFill>
+          <a:blip r:embed="rId4">
+            <a:extLst>
+              <a:ext uri="{28A0092B-C50C-407E-A947-70E740481C1C}">
+                <a14:useLocalDpi xmlns:a14="http://schemas.microsoft.com/office/drawing/2010/main" val="0"/>
+              </a:ext>
+            </a:extLst>
+          </a:blip>
+          <a:srcRect/>
+          <a:stretch>
+            <a:fillRect/>
+          </a:stretch>
+        </p:blipFill>
+        <p:spPr bwMode="auto">
+          <a:xfrm>
+            <a:off x="2112264" y="1444191"/>
+            <a:ext cx="1727168" cy="1056402"/>
+          </a:xfrm>
+          <a:prstGeom prst="rect">
+            <a:avLst/>
+          </a:prstGeom>
+          <a:noFill/>
+          <a:extLst>
+            <a:ext uri="{909E8E84-426E-40DD-AFC4-6F175D3DCCD1}">
+              <a14:hiddenFill xmlns:a14="http://schemas.microsoft.com/office/drawing/2010/main">
+                <a:solidFill>
+                  <a:srgbClr val="FFFFFF"/>
+                </a:solidFill>
+              </a14:hiddenFill>
+            </a:ext>
+          </a:extLst>
+        </p:spPr>
+      </p:pic>
+      <p:pic>
+        <p:nvPicPr>
+          <p:cNvPr id="3" name="Picture 2">
+            <a:extLst>
+              <a:ext uri="{FF2B5EF4-FFF2-40B4-BE49-F238E27FC236}">
+                <a16:creationId xmlns:a16="http://schemas.microsoft.com/office/drawing/2014/main" id="{ED2C3DB4-0D32-4F83-AFC2-6866F97D567A}"/>
               </a:ext>
             </a:extLst>
           </p:cNvPr>
@@ -8206,25 +10349,72 @@
           <p:nvPr/>
         </p:nvPicPr>
         <p:blipFill>
-          <a:blip r:embed="rId3"/>
+          <a:blip r:embed="rId5"/>
           <a:stretch>
             <a:fillRect/>
           </a:stretch>
         </p:blipFill>
         <p:spPr>
           <a:xfrm>
-            <a:off x="646977" y="1323092"/>
-            <a:ext cx="10940717" cy="4642520"/>
+            <a:off x="1043379" y="4416560"/>
+            <a:ext cx="2796053" cy="969802"/>
           </a:xfrm>
           <a:prstGeom prst="rect">
             <a:avLst/>
           </a:prstGeom>
         </p:spPr>
       </p:pic>
+      <p:pic>
+        <p:nvPicPr>
+          <p:cNvPr id="1030" name="Picture 6">
+            <a:extLst>
+              <a:ext uri="{FF2B5EF4-FFF2-40B4-BE49-F238E27FC236}">
+                <a16:creationId xmlns:a16="http://schemas.microsoft.com/office/drawing/2014/main" id="{AF7118D0-1F21-453B-9268-AFC6B3648FEC}"/>
+              </a:ext>
+            </a:extLst>
+          </p:cNvPr>
+          <p:cNvPicPr>
+            <a:picLocks noChangeAspect="1" noChangeArrowheads="1"/>
+          </p:cNvPicPr>
+          <p:nvPr/>
+        </p:nvPicPr>
+        <p:blipFill>
+          <a:blip r:embed="rId6">
+            <a:extLst>
+              <a:ext uri="{28A0092B-C50C-407E-A947-70E740481C1C}">
+                <a14:useLocalDpi xmlns:a14="http://schemas.microsoft.com/office/drawing/2010/main" val="0"/>
+              </a:ext>
+            </a:extLst>
+          </a:blip>
+          <a:srcRect/>
+          <a:stretch>
+            <a:fillRect/>
+          </a:stretch>
+        </p:blipFill>
+        <p:spPr bwMode="auto">
+          <a:xfrm>
+            <a:off x="225874" y="2998676"/>
+            <a:ext cx="2384311" cy="860647"/>
+          </a:xfrm>
+          <a:prstGeom prst="rect">
+            <a:avLst/>
+          </a:prstGeom>
+          <a:noFill/>
+          <a:extLst>
+            <a:ext uri="{909E8E84-426E-40DD-AFC4-6F175D3DCCD1}">
+              <a14:hiddenFill xmlns:a14="http://schemas.microsoft.com/office/drawing/2010/main">
+                <a:solidFill>
+                  <a:srgbClr val="FFFFFF"/>
+                </a:solidFill>
+              </a14:hiddenFill>
+            </a:ext>
+          </a:extLst>
+        </p:spPr>
+      </p:pic>
     </p:spTree>
     <p:extLst>
       <p:ext uri="{BB962C8B-B14F-4D97-AF65-F5344CB8AC3E}">
-        <p14:creationId xmlns:p14="http://schemas.microsoft.com/office/powerpoint/2010/main" val="154948372"/>
+        <p14:creationId xmlns:p14="http://schemas.microsoft.com/office/powerpoint/2010/main" val="1248339744"/>
       </p:ext>
     </p:extLst>
   </p:cSld>
@@ -8310,7 +10500,7 @@
         <p:spPr>
           <a:xfrm>
             <a:off x="4478301" y="1444191"/>
-            <a:ext cx="7487825" cy="2000548"/>
+            <a:ext cx="7487825" cy="2462213"/>
           </a:xfrm>
           <a:prstGeom prst="rect">
             <a:avLst/>
@@ -8332,27 +10522,8 @@
                 <a:ea typeface="Arial" charset="0"/>
                 <a:cs typeface="Arial" charset="0"/>
               </a:rPr>
-              <a:t>Lead text here</a:t>
-            </a:r>
-            <a:r>
-              <a:rPr lang="mr-IN" sz="2400" b="1" dirty="0">
-                <a:solidFill>
-                  <a:srgbClr val="CFB87C"/>
-                </a:solidFill>
-                <a:latin typeface="Arial" charset="0"/>
-                <a:ea typeface="Arial" charset="0"/>
-                <a:cs typeface="Arial" charset="0"/>
-              </a:rPr>
-              <a:t>…</a:t>
-            </a:r>
-            <a:endParaRPr lang="en-US" sz="2400" b="1" dirty="0">
-              <a:solidFill>
-                <a:srgbClr val="CFB87C"/>
-              </a:solidFill>
-              <a:latin typeface="Arial" charset="0"/>
-              <a:ea typeface="Arial" charset="0"/>
-              <a:cs typeface="Arial" charset="0"/>
-            </a:endParaRPr>
+              <a:t>Database and MQTT Broker</a:t>
+            </a:r>
           </a:p>
           <a:p>
             <a:pPr marL="342900" indent="-342900">
@@ -8390,8 +10561,31 @@
                 <a:ea typeface="Arial" charset="0"/>
                 <a:cs typeface="Arial" charset="0"/>
               </a:rPr>
-              <a:t>Bullet 1</a:t>
-            </a:r>
+              <a:t>Database: </a:t>
+            </a:r>
+            <a:r>
+              <a:rPr lang="en-US" sz="2000" dirty="0" err="1">
+                <a:solidFill>
+                  <a:schemeClr val="accent1">
+                    <a:lumMod val="10000"/>
+                  </a:schemeClr>
+                </a:solidFill>
+                <a:latin typeface="Arial" charset="0"/>
+                <a:ea typeface="Arial" charset="0"/>
+                <a:cs typeface="Arial" charset="0"/>
+              </a:rPr>
+              <a:t>mongoDB</a:t>
+            </a:r>
+            <a:endParaRPr lang="en-US" sz="2000" dirty="0">
+              <a:solidFill>
+                <a:schemeClr val="accent1">
+                  <a:lumMod val="10000"/>
+                </a:schemeClr>
+              </a:solidFill>
+              <a:latin typeface="Arial" charset="0"/>
+              <a:ea typeface="Arial" charset="0"/>
+              <a:cs typeface="Arial" charset="0"/>
+            </a:endParaRPr>
           </a:p>
           <a:p>
             <a:pPr marL="342900" indent="-342900">
@@ -8413,7 +10607,53 @@
                 <a:ea typeface="Arial" charset="0"/>
                 <a:cs typeface="Arial" charset="0"/>
               </a:rPr>
-              <a:t>Bullet 2</a:t>
+              <a:t>MQTT Broker: Eclipse </a:t>
+            </a:r>
+            <a:r>
+              <a:rPr lang="en-US" sz="2000" dirty="0" err="1">
+                <a:solidFill>
+                  <a:schemeClr val="accent1">
+                    <a:lumMod val="10000"/>
+                  </a:schemeClr>
+                </a:solidFill>
+                <a:latin typeface="Arial" charset="0"/>
+                <a:ea typeface="Arial" charset="0"/>
+                <a:cs typeface="Arial" charset="0"/>
+              </a:rPr>
+              <a:t>Mosquitto</a:t>
+            </a:r>
+            <a:endParaRPr lang="en-US" sz="2000" dirty="0">
+              <a:solidFill>
+                <a:schemeClr val="accent1">
+                  <a:lumMod val="10000"/>
+                </a:schemeClr>
+              </a:solidFill>
+              <a:latin typeface="Arial" charset="0"/>
+              <a:ea typeface="Arial" charset="0"/>
+              <a:cs typeface="Arial" charset="0"/>
+            </a:endParaRPr>
+          </a:p>
+          <a:p>
+            <a:pPr marL="342900" indent="-342900">
+              <a:lnSpc>
+                <a:spcPct val="150000"/>
+              </a:lnSpc>
+              <a:buSzPct val="85000"/>
+              <a:buFont typeface="Arial" charset="0"/>
+              <a:buChar char="•"/>
+            </a:pPr>
+            <a:r>
+              <a:rPr lang="en-US" sz="2000" dirty="0">
+                <a:solidFill>
+                  <a:schemeClr val="accent1">
+                    <a:lumMod val="10000"/>
+                  </a:schemeClr>
+                </a:solidFill>
+                <a:latin typeface="Arial" charset="0"/>
+                <a:ea typeface="Arial" charset="0"/>
+                <a:cs typeface="Arial" charset="0"/>
+              </a:rPr>
+              <a:t>Each running in their respective official Docker image.</a:t>
             </a:r>
           </a:p>
           <a:p>
@@ -8476,6 +10716,100 @@
           </a:p>
         </p:txBody>
       </p:sp>
+      <p:pic>
+        <p:nvPicPr>
+          <p:cNvPr id="1032" name="Picture 8">
+            <a:extLst>
+              <a:ext uri="{FF2B5EF4-FFF2-40B4-BE49-F238E27FC236}">
+                <a16:creationId xmlns:a16="http://schemas.microsoft.com/office/drawing/2014/main" id="{94853E64-4702-46BF-868D-678FEECE1F01}"/>
+              </a:ext>
+            </a:extLst>
+          </p:cNvPr>
+          <p:cNvPicPr>
+            <a:picLocks noChangeAspect="1" noChangeArrowheads="1"/>
+          </p:cNvPicPr>
+          <p:nvPr/>
+        </p:nvPicPr>
+        <p:blipFill>
+          <a:blip r:embed="rId3">
+            <a:extLst>
+              <a:ext uri="{28A0092B-C50C-407E-A947-70E740481C1C}">
+                <a14:useLocalDpi xmlns:a14="http://schemas.microsoft.com/office/drawing/2010/main" val="0"/>
+              </a:ext>
+            </a:extLst>
+          </a:blip>
+          <a:srcRect/>
+          <a:stretch>
+            <a:fillRect/>
+          </a:stretch>
+        </p:blipFill>
+        <p:spPr bwMode="auto">
+          <a:xfrm>
+            <a:off x="460183" y="2046681"/>
+            <a:ext cx="3158123" cy="852857"/>
+          </a:xfrm>
+          <a:prstGeom prst="rect">
+            <a:avLst/>
+          </a:prstGeom>
+          <a:noFill/>
+          <a:extLst>
+            <a:ext uri="{909E8E84-426E-40DD-AFC4-6F175D3DCCD1}">
+              <a14:hiddenFill xmlns:a14="http://schemas.microsoft.com/office/drawing/2010/main">
+                <a:solidFill>
+                  <a:srgbClr val="FFFFFF"/>
+                </a:solidFill>
+              </a14:hiddenFill>
+            </a:ext>
+          </a:extLst>
+        </p:spPr>
+      </p:pic>
+      <p:pic>
+        <p:nvPicPr>
+          <p:cNvPr id="1038" name="Picture 14">
+            <a:extLst>
+              <a:ext uri="{FF2B5EF4-FFF2-40B4-BE49-F238E27FC236}">
+                <a16:creationId xmlns:a16="http://schemas.microsoft.com/office/drawing/2014/main" id="{7FBCB0E8-9F9E-48A9-8FBB-012CC65D955A}"/>
+              </a:ext>
+            </a:extLst>
+          </p:cNvPr>
+          <p:cNvPicPr>
+            <a:picLocks noChangeAspect="1" noChangeArrowheads="1"/>
+          </p:cNvPicPr>
+          <p:nvPr/>
+        </p:nvPicPr>
+        <p:blipFill>
+          <a:blip r:embed="rId4">
+            <a:extLst>
+              <a:ext uri="{28A0092B-C50C-407E-A947-70E740481C1C}">
+                <a14:useLocalDpi xmlns:a14="http://schemas.microsoft.com/office/drawing/2010/main" val="0"/>
+              </a:ext>
+            </a:extLst>
+          </a:blip>
+          <a:srcRect/>
+          <a:stretch>
+            <a:fillRect/>
+          </a:stretch>
+        </p:blipFill>
+        <p:spPr bwMode="auto">
+          <a:xfrm>
+            <a:off x="533202" y="3462121"/>
+            <a:ext cx="3158123" cy="636169"/>
+          </a:xfrm>
+          <a:prstGeom prst="rect">
+            <a:avLst/>
+          </a:prstGeom>
+          <a:noFill/>
+          <a:extLst>
+            <a:ext uri="{909E8E84-426E-40DD-AFC4-6F175D3DCCD1}">
+              <a14:hiddenFill xmlns:a14="http://schemas.microsoft.com/office/drawing/2010/main">
+                <a:solidFill>
+                  <a:srgbClr val="FFFFFF"/>
+                </a:solidFill>
+              </a14:hiddenFill>
+            </a:ext>
+          </a:extLst>
+        </p:spPr>
+      </p:pic>
     </p:spTree>
     <p:extLst>
       <p:ext uri="{BB962C8B-B14F-4D97-AF65-F5344CB8AC3E}">
@@ -8568,14 +10902,14 @@
       </p:sp>
       <p:sp>
         <p:nvSpPr>
-          <p:cNvPr id="7" name="TextBox 6"/>
+          <p:cNvPr id="10" name="TextBox 9"/>
           <p:cNvSpPr txBox="1"/>
           <p:nvPr/>
         </p:nvSpPr>
         <p:spPr>
           <a:xfrm>
-            <a:off x="442180" y="406073"/>
-            <a:ext cx="11559320" cy="784830"/>
+            <a:off x="337676" y="441016"/>
+            <a:ext cx="11559320" cy="830997"/>
           </a:xfrm>
           <a:prstGeom prst="rect">
             <a:avLst/>
@@ -8588,8 +10922,9 @@
           </a:bodyPr>
           <a:lstStyle/>
           <a:p>
-            <a:r>
-              <a:rPr lang="en-US" sz="4500" dirty="0">
+            <a:pPr algn="ctr"/>
+            <a:r>
+              <a:rPr lang="en-US" sz="4800" dirty="0">
                 <a:solidFill>
                   <a:srgbClr val="CFB87C"/>
                 </a:solidFill>
@@ -8597,137 +10932,45 @@
                 <a:ea typeface="Arial" charset="0"/>
                 <a:cs typeface="Arial" charset="0"/>
               </a:rPr>
-              <a:t>Video Demo</a:t>
+              <a:t>Architecture</a:t>
             </a:r>
           </a:p>
         </p:txBody>
       </p:sp>
-      <p:sp>
-        <p:nvSpPr>
-          <p:cNvPr id="8" name="TextBox 7"/>
-          <p:cNvSpPr txBox="1"/>
+      <p:pic>
+        <p:nvPicPr>
+          <p:cNvPr id="5" name="Picture 4" descr="Graphical user interface, diagram, application&#10;&#10;Description automatically generated">
+            <a:extLst>
+              <a:ext uri="{FF2B5EF4-FFF2-40B4-BE49-F238E27FC236}">
+                <a16:creationId xmlns:a16="http://schemas.microsoft.com/office/drawing/2014/main" id="{ACAA0B7A-0B8B-46FF-8A47-94BF2939F8FD}"/>
+              </a:ext>
+            </a:extLst>
+          </p:cNvPr>
+          <p:cNvPicPr>
+            <a:picLocks noChangeAspect="1"/>
+          </p:cNvPicPr>
           <p:nvPr/>
-        </p:nvSpPr>
+        </p:nvPicPr>
+        <p:blipFill>
+          <a:blip r:embed="rId3"/>
+          <a:stretch>
+            <a:fillRect/>
+          </a:stretch>
+        </p:blipFill>
         <p:spPr>
           <a:xfrm>
-            <a:off x="530874" y="1383408"/>
-            <a:ext cx="10626410" cy="2400657"/>
+            <a:off x="963038" y="996794"/>
+            <a:ext cx="10265923" cy="4864411"/>
           </a:xfrm>
           <a:prstGeom prst="rect">
             <a:avLst/>
           </a:prstGeom>
-          <a:noFill/>
         </p:spPr>
-        <p:txBody>
-          <a:bodyPr wrap="square" numCol="1" rtlCol="0">
-            <a:spAutoFit/>
-          </a:bodyPr>
-          <a:lstStyle/>
-          <a:p>
-            <a:pPr marL="342900" indent="-342900">
-              <a:lnSpc>
-                <a:spcPct val="150000"/>
-              </a:lnSpc>
-              <a:buSzPct val="80000"/>
-              <a:buFont typeface="Arial" charset="0"/>
-              <a:buChar char="•"/>
-            </a:pPr>
-            <a:endParaRPr lang="en-US" sz="2000" b="1" dirty="0">
-              <a:solidFill>
-                <a:schemeClr val="bg1"/>
-              </a:solidFill>
-              <a:latin typeface="Arial" charset="0"/>
-              <a:ea typeface="Arial" charset="0"/>
-              <a:cs typeface="Arial" charset="0"/>
-            </a:endParaRPr>
-          </a:p>
-          <a:p>
-            <a:pPr marL="342900" indent="-342900">
-              <a:lnSpc>
-                <a:spcPct val="150000"/>
-              </a:lnSpc>
-              <a:buSzPct val="80000"/>
-              <a:buFont typeface="Arial" charset="0"/>
-              <a:buChar char="•"/>
-            </a:pPr>
-            <a:r>
-              <a:rPr lang="en-US" sz="2000" dirty="0">
-                <a:solidFill>
-                  <a:schemeClr val="bg1"/>
-                </a:solidFill>
-                <a:latin typeface="Arial" charset="0"/>
-                <a:ea typeface="Arial" charset="0"/>
-                <a:cs typeface="Arial" charset="0"/>
-              </a:rPr>
-              <a:t>Bullet 1</a:t>
-            </a:r>
-          </a:p>
-          <a:p>
-            <a:pPr marL="342900" indent="-342900">
-              <a:lnSpc>
-                <a:spcPct val="150000"/>
-              </a:lnSpc>
-              <a:buSzPct val="80000"/>
-              <a:buFont typeface="Arial" charset="0"/>
-              <a:buChar char="•"/>
-            </a:pPr>
-            <a:r>
-              <a:rPr lang="en-US" sz="2000" dirty="0">
-                <a:solidFill>
-                  <a:schemeClr val="bg1"/>
-                </a:solidFill>
-                <a:latin typeface="Arial" charset="0"/>
-                <a:ea typeface="Arial" charset="0"/>
-                <a:cs typeface="Arial" charset="0"/>
-              </a:rPr>
-              <a:t>Bullet 2</a:t>
-            </a:r>
-          </a:p>
-          <a:p>
-            <a:pPr marL="342900" indent="-342900">
-              <a:lnSpc>
-                <a:spcPct val="150000"/>
-              </a:lnSpc>
-              <a:buSzPct val="80000"/>
-              <a:buFont typeface="Arial" charset="0"/>
-              <a:buChar char="•"/>
-            </a:pPr>
-            <a:r>
-              <a:rPr lang="en-US" sz="2000" dirty="0">
-                <a:solidFill>
-                  <a:schemeClr val="bg1"/>
-                </a:solidFill>
-                <a:latin typeface="Arial" charset="0"/>
-                <a:ea typeface="Arial" charset="0"/>
-                <a:cs typeface="Arial" charset="0"/>
-              </a:rPr>
-              <a:t>Bullet 3</a:t>
-            </a:r>
-          </a:p>
-          <a:p>
-            <a:pPr marL="342900" indent="-342900">
-              <a:lnSpc>
-                <a:spcPct val="150000"/>
-              </a:lnSpc>
-              <a:buSzPct val="80000"/>
-              <a:buFont typeface="Arial" charset="0"/>
-              <a:buChar char="•"/>
-            </a:pPr>
-            <a:endParaRPr lang="en-US" sz="2000" dirty="0">
-              <a:solidFill>
-                <a:schemeClr val="bg1"/>
-              </a:solidFill>
-              <a:latin typeface="Arial" charset="0"/>
-              <a:ea typeface="Arial" charset="0"/>
-              <a:cs typeface="Arial" charset="0"/>
-            </a:endParaRPr>
-          </a:p>
-        </p:txBody>
-      </p:sp>
+      </p:pic>
     </p:spTree>
     <p:extLst>
       <p:ext uri="{BB962C8B-B14F-4D97-AF65-F5344CB8AC3E}">
-        <p14:creationId xmlns:p14="http://schemas.microsoft.com/office/powerpoint/2010/main" val="2722990458"/>
+        <p14:creationId xmlns:p14="http://schemas.microsoft.com/office/powerpoint/2010/main" val="154948372"/>
       </p:ext>
     </p:extLst>
   </p:cSld>
@@ -8740,6 +10983,20 @@
 <file path=ppt/slides/slide8.xml><?xml version="1.0" encoding="utf-8"?>
 <p:sld xmlns:a="http://schemas.openxmlformats.org/drawingml/2006/main" xmlns:r="http://schemas.openxmlformats.org/officeDocument/2006/relationships" xmlns:p="http://schemas.openxmlformats.org/presentationml/2006/main">
   <p:cSld>
+    <p:bg>
+      <p:bgPr>
+        <a:blipFill dpi="0" rotWithShape="1">
+          <a:blip r:embed="rId2">
+            <a:lum/>
+          </a:blip>
+          <a:srcRect/>
+          <a:stretch>
+            <a:fillRect/>
+          </a:stretch>
+        </a:blipFill>
+        <a:effectLst/>
+      </p:bgPr>
+    </p:bg>
     <p:spTree>
       <p:nvGrpSpPr>
         <p:cNvPr id="1" name=""/>
@@ -8756,14 +11013,14 @@
       </p:grpSpPr>
       <p:sp>
         <p:nvSpPr>
-          <p:cNvPr id="4" name="TextBox 3"/>
+          <p:cNvPr id="7" name="TextBox 6"/>
           <p:cNvSpPr txBox="1"/>
           <p:nvPr/>
         </p:nvSpPr>
         <p:spPr>
           <a:xfrm>
-            <a:off x="473230" y="442649"/>
-            <a:ext cx="6055586" cy="769441"/>
+            <a:off x="4386862" y="442649"/>
+            <a:ext cx="8670770" cy="769441"/>
           </a:xfrm>
           <a:prstGeom prst="rect">
             <a:avLst/>
@@ -8785,21 +11042,21 @@
                 <a:ea typeface="Arial" charset="0"/>
                 <a:cs typeface="Arial" charset="0"/>
               </a:rPr>
-              <a:t>Future Work</a:t>
+              <a:t>Architecture</a:t>
             </a:r>
           </a:p>
         </p:txBody>
       </p:sp>
       <p:sp>
         <p:nvSpPr>
-          <p:cNvPr id="5" name="TextBox 4"/>
+          <p:cNvPr id="8" name="TextBox 7"/>
           <p:cNvSpPr txBox="1"/>
           <p:nvPr/>
         </p:nvSpPr>
         <p:spPr>
           <a:xfrm>
-            <a:off x="534190" y="1364943"/>
-            <a:ext cx="7280882" cy="2092881"/>
+            <a:off x="4446565" y="1444191"/>
+            <a:ext cx="7487825" cy="3944093"/>
           </a:xfrm>
           <a:prstGeom prst="rect">
             <a:avLst/>
@@ -8813,32 +11070,23 @@
           <a:lstStyle/>
           <a:p>
             <a:r>
-              <a:rPr lang="en-US" sz="2000" b="1" dirty="0">
+              <a:rPr lang="en-US" sz="2400" b="1" dirty="0">
                 <a:solidFill>
-                  <a:schemeClr val="accent1">
-                    <a:lumMod val="10000"/>
-                  </a:schemeClr>
+                  <a:srgbClr val="CFB87C"/>
                 </a:solidFill>
                 <a:latin typeface="Arial" charset="0"/>
                 <a:ea typeface="Arial" charset="0"/>
                 <a:cs typeface="Arial" charset="0"/>
               </a:rPr>
-              <a:t>Lead text here</a:t>
-            </a:r>
-            <a:r>
-              <a:rPr lang="mr-IN" sz="2000" b="1" dirty="0">
-                <a:solidFill>
-                  <a:schemeClr val="accent1">
-                    <a:lumMod val="10000"/>
-                  </a:schemeClr>
-                </a:solidFill>
-                <a:latin typeface="Arial" charset="0"/>
-                <a:ea typeface="Arial" charset="0"/>
-                <a:cs typeface="Arial" charset="0"/>
-              </a:rPr>
-              <a:t>…</a:t>
-            </a:r>
-            <a:endParaRPr lang="en-US" sz="2000" b="1" dirty="0">
+              <a:t>Kubernetes</a:t>
+            </a:r>
+          </a:p>
+          <a:p>
+            <a:pPr marL="342900" indent="-342900">
+              <a:buFont typeface="Wingdings" charset="2"/>
+              <a:buChar char="§"/>
+            </a:pPr>
+            <a:endParaRPr lang="en-US" sz="2000" dirty="0">
               <a:solidFill>
                 <a:schemeClr val="accent1">
                   <a:lumMod val="10000"/>
@@ -8850,22 +11098,11 @@
             </a:endParaRPr>
           </a:p>
           <a:p>
-            <a:endParaRPr lang="en-US" sz="2000" b="1" dirty="0">
-              <a:solidFill>
-                <a:schemeClr val="accent1">
-                  <a:lumMod val="10000"/>
-                </a:schemeClr>
-              </a:solidFill>
-              <a:latin typeface="Arial" charset="0"/>
-              <a:ea typeface="Arial" charset="0"/>
-              <a:cs typeface="Arial" charset="0"/>
-            </a:endParaRPr>
-          </a:p>
-          <a:p>
             <a:pPr marL="342900" indent="-342900">
               <a:lnSpc>
                 <a:spcPct val="150000"/>
               </a:lnSpc>
+              <a:buSzPct val="85000"/>
               <a:buFont typeface="Arial" charset="0"/>
               <a:buChar char="•"/>
             </a:pPr>
@@ -8880,16 +11117,15 @@
                 <a:ea typeface="Arial" charset="0"/>
                 <a:cs typeface="Arial" charset="0"/>
               </a:rPr>
-              <a:t>Bullet 1</a:t>
-            </a:r>
-          </a:p>
-          <a:p>
-            <a:pPr marL="342900" indent="-342900">
+              <a:t>“Google Kubernetes Engine (GKE) provides a managed environment for deploying, managing, and scaling your containerized applications using Google infrastructure. The GKE environment consists of multiple machines (specifically, Compute Engine instances) grouped together to form a cluster.”</a:t>
+            </a:r>
+          </a:p>
+          <a:p>
+            <a:pPr algn="r">
               <a:lnSpc>
                 <a:spcPct val="150000"/>
               </a:lnSpc>
-              <a:buFont typeface="Arial" charset="0"/>
-              <a:buChar char="•"/>
+              <a:buSzPct val="85000"/>
             </a:pPr>
             <a:r>
               <a:rPr lang="en-US" sz="2000" dirty="0">
@@ -8902,43 +11138,21 @@
                 <a:ea typeface="Arial" charset="0"/>
                 <a:cs typeface="Arial" charset="0"/>
               </a:rPr>
-              <a:t>Bullet 2</a:t>
-            </a:r>
-          </a:p>
-          <a:p>
-            <a:pPr marL="342900" indent="-342900">
-              <a:lnSpc>
-                <a:spcPct val="150000"/>
-              </a:lnSpc>
-              <a:buFont typeface="Arial" charset="0"/>
-              <a:buChar char="•"/>
-            </a:pPr>
-            <a:r>
-              <a:rPr lang="en-US" sz="2000" dirty="0">
-                <a:solidFill>
-                  <a:schemeClr val="accent1">
-                    <a:lumMod val="10000"/>
-                  </a:schemeClr>
-                </a:solidFill>
-                <a:latin typeface="Arial" charset="0"/>
-                <a:ea typeface="Arial" charset="0"/>
-                <a:cs typeface="Arial" charset="0"/>
-              </a:rPr>
-              <a:t>Bullet 3</a:t>
+              <a:t>- GKE Overview</a:t>
             </a:r>
           </a:p>
         </p:txBody>
       </p:sp>
       <p:sp>
         <p:nvSpPr>
-          <p:cNvPr id="6" name="Rectangle 5"/>
+          <p:cNvPr id="9" name="Rectangle 8"/>
           <p:cNvSpPr/>
           <p:nvPr/>
         </p:nvSpPr>
         <p:spPr>
           <a:xfrm>
-            <a:off x="8001000" y="0"/>
-            <a:ext cx="4191000" cy="5943600"/>
+            <a:off x="0" y="0"/>
+            <a:ext cx="4224528" cy="5943600"/>
           </a:xfrm>
           <a:prstGeom prst="rect">
             <a:avLst/>
@@ -8971,14 +11185,91 @@
           <a:lstStyle/>
           <a:p>
             <a:pPr algn="ctr"/>
-            <a:endParaRPr lang="en-US"/>
+            <a:endParaRPr lang="en-US" dirty="0"/>
           </a:p>
         </p:txBody>
       </p:sp>
+      <p:pic>
+        <p:nvPicPr>
+          <p:cNvPr id="3074" name="Picture 2">
+            <a:extLst>
+              <a:ext uri="{FF2B5EF4-FFF2-40B4-BE49-F238E27FC236}">
+                <a16:creationId xmlns:a16="http://schemas.microsoft.com/office/drawing/2014/main" id="{423F0ADF-5AAA-4C40-B067-00DD0518E781}"/>
+              </a:ext>
+            </a:extLst>
+          </p:cNvPr>
+          <p:cNvPicPr>
+            <a:picLocks noChangeAspect="1" noChangeArrowheads="1"/>
+          </p:cNvPicPr>
+          <p:nvPr/>
+        </p:nvPicPr>
+        <p:blipFill>
+          <a:blip r:embed="rId3">
+            <a:extLst>
+              <a:ext uri="{28A0092B-C50C-407E-A947-70E740481C1C}">
+                <a14:useLocalDpi xmlns:a14="http://schemas.microsoft.com/office/drawing/2010/main" val="0"/>
+              </a:ext>
+            </a:extLst>
+          </a:blip>
+          <a:srcRect/>
+          <a:stretch>
+            <a:fillRect/>
+          </a:stretch>
+        </p:blipFill>
+        <p:spPr bwMode="auto">
+          <a:xfrm>
+            <a:off x="1055802" y="604101"/>
+            <a:ext cx="1869649" cy="1869649"/>
+          </a:xfrm>
+          <a:prstGeom prst="rect">
+            <a:avLst/>
+          </a:prstGeom>
+          <a:noFill/>
+          <a:extLst>
+            <a:ext uri="{909E8E84-426E-40DD-AFC4-6F175D3DCCD1}">
+              <a14:hiddenFill xmlns:a14="http://schemas.microsoft.com/office/drawing/2010/main">
+                <a:solidFill>
+                  <a:srgbClr val="FFFFFF"/>
+                </a:solidFill>
+              </a14:hiddenFill>
+            </a:ext>
+          </a:extLst>
+        </p:spPr>
+      </p:pic>
+      <p:pic>
+        <p:nvPicPr>
+          <p:cNvPr id="4" name="Picture 3" descr="Logo&#10;&#10;Description automatically generated">
+            <a:extLst>
+              <a:ext uri="{FF2B5EF4-FFF2-40B4-BE49-F238E27FC236}">
+                <a16:creationId xmlns:a16="http://schemas.microsoft.com/office/drawing/2014/main" id="{5688365A-B8BE-4BA7-93C5-6293B22D9689}"/>
+              </a:ext>
+            </a:extLst>
+          </p:cNvPr>
+          <p:cNvPicPr>
+            <a:picLocks noChangeAspect="1"/>
+          </p:cNvPicPr>
+          <p:nvPr/>
+        </p:nvPicPr>
+        <p:blipFill>
+          <a:blip r:embed="rId4"/>
+          <a:stretch>
+            <a:fillRect/>
+          </a:stretch>
+        </p:blipFill>
+        <p:spPr>
+          <a:xfrm>
+            <a:off x="524832" y="2861322"/>
+            <a:ext cx="2944232" cy="2328920"/>
+          </a:xfrm>
+          <a:prstGeom prst="rect">
+            <a:avLst/>
+          </a:prstGeom>
+        </p:spPr>
+      </p:pic>
     </p:spTree>
     <p:extLst>
       <p:ext uri="{BB962C8B-B14F-4D97-AF65-F5344CB8AC3E}">
-        <p14:creationId xmlns:p14="http://schemas.microsoft.com/office/powerpoint/2010/main" val="777767792"/>
+        <p14:creationId xmlns:p14="http://schemas.microsoft.com/office/powerpoint/2010/main" val="1184579908"/>
       </p:ext>
     </p:extLst>
   </p:cSld>
@@ -8991,6 +11282,20 @@
 <file path=ppt/slides/slide9.xml><?xml version="1.0" encoding="utf-8"?>
 <p:sld xmlns:a="http://schemas.openxmlformats.org/drawingml/2006/main" xmlns:r="http://schemas.openxmlformats.org/officeDocument/2006/relationships" xmlns:p="http://schemas.openxmlformats.org/presentationml/2006/main">
   <p:cSld>
+    <p:bg>
+      <p:bgPr>
+        <a:blipFill dpi="0" rotWithShape="1">
+          <a:blip r:embed="rId2">
+            <a:lum/>
+          </a:blip>
+          <a:srcRect/>
+          <a:stretch>
+            <a:fillRect/>
+          </a:stretch>
+        </a:blipFill>
+        <a:effectLst/>
+      </p:bgPr>
+    </p:bg>
     <p:spTree>
       <p:nvGrpSpPr>
         <p:cNvPr id="1" name=""/>
@@ -9007,21 +11312,186 @@
       </p:grpSpPr>
       <p:sp>
         <p:nvSpPr>
-          <p:cNvPr id="4" name="Rectangle 3"/>
+          <p:cNvPr id="7" name="TextBox 6"/>
+          <p:cNvSpPr txBox="1"/>
+          <p:nvPr/>
+        </p:nvSpPr>
+        <p:spPr>
+          <a:xfrm>
+            <a:off x="4386862" y="442649"/>
+            <a:ext cx="8670770" cy="769441"/>
+          </a:xfrm>
+          <a:prstGeom prst="rect">
+            <a:avLst/>
+          </a:prstGeom>
+          <a:noFill/>
+        </p:spPr>
+        <p:txBody>
+          <a:bodyPr wrap="square" rtlCol="0">
+            <a:spAutoFit/>
+          </a:bodyPr>
+          <a:lstStyle/>
+          <a:p>
+            <a:r>
+              <a:rPr lang="en-US" sz="4400" dirty="0">
+                <a:solidFill>
+                  <a:srgbClr val="CFB87C"/>
+                </a:solidFill>
+                <a:latin typeface="Arial" charset="0"/>
+                <a:ea typeface="Arial" charset="0"/>
+                <a:cs typeface="Arial" charset="0"/>
+              </a:rPr>
+              <a:t>CI/CD</a:t>
+            </a:r>
+          </a:p>
+        </p:txBody>
+      </p:sp>
+      <p:sp>
+        <p:nvSpPr>
+          <p:cNvPr id="8" name="TextBox 7"/>
+          <p:cNvSpPr txBox="1"/>
+          <p:nvPr/>
+        </p:nvSpPr>
+        <p:spPr>
+          <a:xfrm>
+            <a:off x="4446565" y="1444191"/>
+            <a:ext cx="7487825" cy="3482428"/>
+          </a:xfrm>
+          <a:prstGeom prst="rect">
+            <a:avLst/>
+          </a:prstGeom>
+          <a:noFill/>
+        </p:spPr>
+        <p:txBody>
+          <a:bodyPr wrap="square" rtlCol="0">
+            <a:spAutoFit/>
+          </a:bodyPr>
+          <a:lstStyle/>
+          <a:p>
+            <a:r>
+              <a:rPr lang="en-US" sz="2400" b="1" dirty="0" err="1">
+                <a:solidFill>
+                  <a:srgbClr val="CFB87C"/>
+                </a:solidFill>
+                <a:latin typeface="Arial" charset="0"/>
+                <a:ea typeface="Arial" charset="0"/>
+                <a:cs typeface="Arial" charset="0"/>
+              </a:rPr>
+              <a:t>Github</a:t>
+            </a:r>
+            <a:r>
+              <a:rPr lang="en-US" sz="2400" b="1" dirty="0">
+                <a:solidFill>
+                  <a:srgbClr val="CFB87C"/>
+                </a:solidFill>
+                <a:latin typeface="Arial" charset="0"/>
+                <a:ea typeface="Arial" charset="0"/>
+                <a:cs typeface="Arial" charset="0"/>
+              </a:rPr>
+              <a:t> and </a:t>
+            </a:r>
+            <a:r>
+              <a:rPr lang="en-US" sz="2400" b="1" dirty="0" err="1">
+                <a:solidFill>
+                  <a:srgbClr val="CFB87C"/>
+                </a:solidFill>
+                <a:latin typeface="Arial" charset="0"/>
+                <a:ea typeface="Arial" charset="0"/>
+                <a:cs typeface="Arial" charset="0"/>
+              </a:rPr>
+              <a:t>Github</a:t>
+            </a:r>
+            <a:r>
+              <a:rPr lang="en-US" sz="2400" b="1" dirty="0">
+                <a:solidFill>
+                  <a:srgbClr val="CFB87C"/>
+                </a:solidFill>
+                <a:latin typeface="Arial" charset="0"/>
+                <a:ea typeface="Arial" charset="0"/>
+                <a:cs typeface="Arial" charset="0"/>
+              </a:rPr>
+              <a:t> Actions</a:t>
+            </a:r>
+          </a:p>
+          <a:p>
+            <a:pPr marL="342900" indent="-342900">
+              <a:buFont typeface="Wingdings" charset="2"/>
+              <a:buChar char="§"/>
+            </a:pPr>
+            <a:endParaRPr lang="en-US" sz="2000" dirty="0">
+              <a:solidFill>
+                <a:schemeClr val="accent1">
+                  <a:lumMod val="10000"/>
+                </a:schemeClr>
+              </a:solidFill>
+              <a:latin typeface="Arial" charset="0"/>
+              <a:ea typeface="Arial" charset="0"/>
+              <a:cs typeface="Arial" charset="0"/>
+            </a:endParaRPr>
+          </a:p>
+          <a:p>
+            <a:pPr marL="342900" indent="-342900">
+              <a:lnSpc>
+                <a:spcPct val="150000"/>
+              </a:lnSpc>
+              <a:buSzPct val="85000"/>
+              <a:buFont typeface="Arial" charset="0"/>
+              <a:buChar char="•"/>
+            </a:pPr>
+            <a:r>
+              <a:rPr lang="en-US" sz="2000" dirty="0">
+                <a:solidFill>
+                  <a:schemeClr val="accent1">
+                    <a:lumMod val="10000"/>
+                  </a:schemeClr>
+                </a:solidFill>
+                <a:latin typeface="Arial" charset="0"/>
+                <a:ea typeface="Arial" charset="0"/>
+                <a:cs typeface="Arial" charset="0"/>
+              </a:rPr>
+              <a:t>“GitHub Actions makes it easy to automate all your software workflows, now with world-class CI/CD. Build, test, and deploy your code right from GitHub. Make code reviews, branch management, and issue triaging work the way you want.”</a:t>
+            </a:r>
+          </a:p>
+          <a:p>
+            <a:pPr algn="r">
+              <a:lnSpc>
+                <a:spcPct val="150000"/>
+              </a:lnSpc>
+              <a:buSzPct val="85000"/>
+            </a:pPr>
+            <a:r>
+              <a:rPr lang="en-US" sz="2000" dirty="0">
+                <a:solidFill>
+                  <a:schemeClr val="accent1">
+                    <a:lumMod val="10000"/>
+                  </a:schemeClr>
+                </a:solidFill>
+                <a:latin typeface="Arial" charset="0"/>
+                <a:ea typeface="Arial" charset="0"/>
+                <a:cs typeface="Arial" charset="0"/>
+              </a:rPr>
+              <a:t>- github.com/features/actions</a:t>
+            </a:r>
+          </a:p>
+        </p:txBody>
+      </p:sp>
+      <p:sp>
+        <p:nvSpPr>
+          <p:cNvPr id="9" name="Rectangle 8"/>
           <p:cNvSpPr/>
           <p:nvPr/>
         </p:nvSpPr>
         <p:spPr>
           <a:xfrm>
             <a:off x="0" y="0"/>
-            <a:ext cx="12192000" cy="6016692"/>
+            <a:ext cx="4224528" cy="5943600"/>
           </a:xfrm>
           <a:prstGeom prst="rect">
             <a:avLst/>
           </a:prstGeom>
           <a:solidFill>
-            <a:schemeClr val="accent1">
-              <a:lumMod val="10000"/>
+            <a:schemeClr val="bg2">
+              <a:lumMod val="90000"/>
             </a:schemeClr>
           </a:solidFill>
           <a:ln>
@@ -9051,168 +11521,104 @@
           </a:p>
         </p:txBody>
       </p:sp>
-      <p:sp>
-        <p:nvSpPr>
-          <p:cNvPr id="7" name="TextBox 6"/>
-          <p:cNvSpPr txBox="1"/>
+      <p:pic>
+        <p:nvPicPr>
+          <p:cNvPr id="4098" name="Picture 2" descr="GitHub Actions · GitHub">
+            <a:extLst>
+              <a:ext uri="{FF2B5EF4-FFF2-40B4-BE49-F238E27FC236}">
+                <a16:creationId xmlns:a16="http://schemas.microsoft.com/office/drawing/2014/main" id="{A2E8E6DA-1328-4CE3-9D87-DB08E5F454AE}"/>
+              </a:ext>
+            </a:extLst>
+          </p:cNvPr>
+          <p:cNvPicPr>
+            <a:picLocks noChangeAspect="1" noChangeArrowheads="1"/>
+          </p:cNvPicPr>
           <p:nvPr/>
-        </p:nvSpPr>
-        <p:spPr>
+        </p:nvPicPr>
+        <p:blipFill>
+          <a:blip r:embed="rId3">
+            <a:extLst>
+              <a:ext uri="{28A0092B-C50C-407E-A947-70E740481C1C}">
+                <a14:useLocalDpi xmlns:a14="http://schemas.microsoft.com/office/drawing/2010/main" val="0"/>
+              </a:ext>
+            </a:extLst>
+          </a:blip>
+          <a:srcRect/>
+          <a:stretch>
+            <a:fillRect/>
+          </a:stretch>
+        </p:blipFill>
+        <p:spPr bwMode="auto">
           <a:xfrm>
-            <a:off x="442180" y="406073"/>
-            <a:ext cx="11559320" cy="784830"/>
+            <a:off x="1137758" y="3396936"/>
+            <a:ext cx="1628978" cy="1628978"/>
           </a:xfrm>
           <a:prstGeom prst="rect">
             <a:avLst/>
           </a:prstGeom>
           <a:noFill/>
+          <a:extLst>
+            <a:ext uri="{909E8E84-426E-40DD-AFC4-6F175D3DCCD1}">
+              <a14:hiddenFill xmlns:a14="http://schemas.microsoft.com/office/drawing/2010/main">
+                <a:solidFill>
+                  <a:srgbClr val="FFFFFF"/>
+                </a:solidFill>
+              </a14:hiddenFill>
+            </a:ext>
+          </a:extLst>
         </p:spPr>
-        <p:txBody>
-          <a:bodyPr wrap="square" rtlCol="0">
-            <a:spAutoFit/>
-          </a:bodyPr>
-          <a:lstStyle/>
-          <a:p>
-            <a:r>
-              <a:rPr lang="en-US" sz="4500" dirty="0">
-                <a:solidFill>
-                  <a:srgbClr val="CFB87C"/>
-                </a:solidFill>
-                <a:latin typeface="Arial" charset="0"/>
-                <a:ea typeface="Arial" charset="0"/>
-                <a:cs typeface="Arial" charset="0"/>
-              </a:rPr>
-              <a:t>Questions</a:t>
-            </a:r>
-          </a:p>
-        </p:txBody>
-      </p:sp>
-      <p:sp>
-        <p:nvSpPr>
-          <p:cNvPr id="8" name="TextBox 7"/>
-          <p:cNvSpPr txBox="1"/>
+      </p:pic>
+      <p:pic>
+        <p:nvPicPr>
+          <p:cNvPr id="4100" name="Picture 4">
+            <a:extLst>
+              <a:ext uri="{FF2B5EF4-FFF2-40B4-BE49-F238E27FC236}">
+                <a16:creationId xmlns:a16="http://schemas.microsoft.com/office/drawing/2014/main" id="{1244F370-25FA-4D9A-91FE-78DE3B28C527}"/>
+              </a:ext>
+            </a:extLst>
+          </p:cNvPr>
+          <p:cNvPicPr>
+            <a:picLocks noChangeAspect="1" noChangeArrowheads="1"/>
+          </p:cNvPicPr>
           <p:nvPr/>
-        </p:nvSpPr>
-        <p:spPr>
+        </p:nvPicPr>
+        <p:blipFill>
+          <a:blip r:embed="rId4">
+            <a:extLst>
+              <a:ext uri="{28A0092B-C50C-407E-A947-70E740481C1C}">
+                <a14:useLocalDpi xmlns:a14="http://schemas.microsoft.com/office/drawing/2010/main" val="0"/>
+              </a:ext>
+            </a:extLst>
+          </a:blip>
+          <a:srcRect/>
+          <a:stretch>
+            <a:fillRect/>
+          </a:stretch>
+        </p:blipFill>
+        <p:spPr bwMode="auto">
           <a:xfrm>
-            <a:off x="530874" y="1383408"/>
-            <a:ext cx="10626410" cy="2400657"/>
+            <a:off x="996140" y="989814"/>
+            <a:ext cx="1912215" cy="1912215"/>
           </a:xfrm>
           <a:prstGeom prst="rect">
             <a:avLst/>
           </a:prstGeom>
           <a:noFill/>
+          <a:extLst>
+            <a:ext uri="{909E8E84-426E-40DD-AFC4-6F175D3DCCD1}">
+              <a14:hiddenFill xmlns:a14="http://schemas.microsoft.com/office/drawing/2010/main">
+                <a:solidFill>
+                  <a:srgbClr val="FFFFFF"/>
+                </a:solidFill>
+              </a14:hiddenFill>
+            </a:ext>
+          </a:extLst>
         </p:spPr>
-        <p:txBody>
-          <a:bodyPr wrap="square" numCol="1" rtlCol="0">
-            <a:spAutoFit/>
-          </a:bodyPr>
-          <a:lstStyle/>
-          <a:p>
-            <a:pPr marL="342900" indent="-342900">
-              <a:lnSpc>
-                <a:spcPct val="150000"/>
-              </a:lnSpc>
-              <a:buSzPct val="80000"/>
-              <a:buFont typeface="Arial" charset="0"/>
-              <a:buChar char="•"/>
-            </a:pPr>
-            <a:endParaRPr lang="en-US" sz="2000" b="1" dirty="0">
-              <a:solidFill>
-                <a:schemeClr val="bg1"/>
-              </a:solidFill>
-              <a:latin typeface="Arial" charset="0"/>
-              <a:ea typeface="Arial" charset="0"/>
-              <a:cs typeface="Arial" charset="0"/>
-            </a:endParaRPr>
-          </a:p>
-          <a:p>
-            <a:pPr marL="342900" indent="-342900">
-              <a:lnSpc>
-                <a:spcPct val="150000"/>
-              </a:lnSpc>
-              <a:buSzPct val="80000"/>
-              <a:buFont typeface="Arial" charset="0"/>
-              <a:buChar char="•"/>
-            </a:pPr>
-            <a:r>
-              <a:rPr lang="en-US" sz="2000" dirty="0">
-                <a:solidFill>
-                  <a:schemeClr val="bg1"/>
-                </a:solidFill>
-                <a:latin typeface="Arial" charset="0"/>
-                <a:ea typeface="Arial" charset="0"/>
-                <a:cs typeface="Arial" charset="0"/>
-              </a:rPr>
-              <a:t>Bullet 1</a:t>
-            </a:r>
-          </a:p>
-          <a:p>
-            <a:pPr marL="342900" indent="-342900">
-              <a:lnSpc>
-                <a:spcPct val="150000"/>
-              </a:lnSpc>
-              <a:buSzPct val="80000"/>
-              <a:buFont typeface="Arial" charset="0"/>
-              <a:buChar char="•"/>
-            </a:pPr>
-            <a:r>
-              <a:rPr lang="en-US" sz="2000" dirty="0">
-                <a:solidFill>
-                  <a:schemeClr val="bg1"/>
-                </a:solidFill>
-                <a:latin typeface="Arial" charset="0"/>
-                <a:ea typeface="Arial" charset="0"/>
-                <a:cs typeface="Arial" charset="0"/>
-              </a:rPr>
-              <a:t>Bullet 2</a:t>
-            </a:r>
-          </a:p>
-          <a:p>
-            <a:pPr marL="342900" indent="-342900">
-              <a:lnSpc>
-                <a:spcPct val="150000"/>
-              </a:lnSpc>
-              <a:buSzPct val="80000"/>
-              <a:buFont typeface="Arial" charset="0"/>
-              <a:buChar char="•"/>
-            </a:pPr>
-            <a:r>
-              <a:rPr lang="en-US" sz="2000" dirty="0">
-                <a:solidFill>
-                  <a:schemeClr val="bg1"/>
-                </a:solidFill>
-                <a:latin typeface="Arial" charset="0"/>
-                <a:ea typeface="Arial" charset="0"/>
-                <a:cs typeface="Arial" charset="0"/>
-              </a:rPr>
-              <a:t>Bullet 3</a:t>
-            </a:r>
-          </a:p>
-          <a:p>
-            <a:pPr marL="342900" indent="-342900">
-              <a:lnSpc>
-                <a:spcPct val="150000"/>
-              </a:lnSpc>
-              <a:buSzPct val="80000"/>
-              <a:buFont typeface="Arial" charset="0"/>
-              <a:buChar char="•"/>
-            </a:pPr>
-            <a:endParaRPr lang="en-US" sz="2000" dirty="0">
-              <a:solidFill>
-                <a:schemeClr val="bg1"/>
-              </a:solidFill>
-              <a:latin typeface="Arial" charset="0"/>
-              <a:ea typeface="Arial" charset="0"/>
-              <a:cs typeface="Arial" charset="0"/>
-            </a:endParaRPr>
-          </a:p>
-        </p:txBody>
-      </p:sp>
+      </p:pic>
     </p:spTree>
     <p:extLst>
       <p:ext uri="{BB962C8B-B14F-4D97-AF65-F5344CB8AC3E}">
-        <p14:creationId xmlns:p14="http://schemas.microsoft.com/office/powerpoint/2010/main" val="4088068854"/>
+        <p14:creationId xmlns:p14="http://schemas.microsoft.com/office/powerpoint/2010/main" val="699795860"/>
       </p:ext>
     </p:extLst>
   </p:cSld>

</xml_diff>